<commit_message>
Instructions for using external volume
</commit_message>
<xml_diff>
--- a/Info/Guide.pptx
+++ b/Info/Guide.pptx
@@ -5,7 +5,7 @@
     <p:sldMasterId id="2147483648" r:id="rId1"/>
   </p:sldMasterIdLst>
   <p:notesMasterIdLst>
-    <p:notesMasterId r:id="rId23"/>
+    <p:notesMasterId r:id="rId27"/>
   </p:notesMasterIdLst>
   <p:sldIdLst>
     <p:sldId id="257" r:id="rId2"/>
@@ -29,6 +29,10 @@
     <p:sldId id="283" r:id="rId20"/>
     <p:sldId id="284" r:id="rId21"/>
     <p:sldId id="285" r:id="rId22"/>
+    <p:sldId id="287" r:id="rId23"/>
+    <p:sldId id="288" r:id="rId24"/>
+    <p:sldId id="289" r:id="rId25"/>
+    <p:sldId id="290" r:id="rId26"/>
   </p:sldIdLst>
   <p:sldSz cx="12192000" cy="6858000"/>
   <p:notesSz cx="6858000" cy="9144000"/>
@@ -266,7 +270,7 @@
       <p15:sldGuideLst xmlns:p15="http://schemas.microsoft.com/office/powerpoint/2012/main"/>
     </p:ext>
     <p:ext uri="http://customooxmlschemas.google.com/">
-      <go:slidesCustomData xmlns="" xmlns:mc="http://schemas.openxmlformats.org/markup-compatibility/2006" xmlns:mv="urn:schemas-microsoft-com:mac:vml" xmlns:c="http://schemas.openxmlformats.org/drawingml/2006/chart" xmlns:dgm="http://schemas.openxmlformats.org/drawingml/2006/diagram" xmlns:o="urn:schemas-microsoft-com:office:office" xmlns:v="urn:schemas-microsoft-com:vml" xmlns:pvml="urn:schemas-microsoft-com:office:powerpoint" xmlns:com="http://schemas.openxmlformats.org/drawingml/2006/compatibility" xmlns:p14="http://schemas.microsoft.com/office/powerpoint/2010/main" xmlns:p15="http://schemas.microsoft.com/office/powerpoint/2012/main" xmlns:ahyp="http://schemas.microsoft.com/office/drawing/2018/hyperlinkcolor" xmlns:go="http://customooxmlschemas.google.com/" r:id="rId25" roundtripDataSignature="AMtx7mihFzvj0a0a4pDfHA8Gtqtqz6tFDQ=="/>
+      <go:slidesCustomData xmlns="" xmlns:mc="http://schemas.openxmlformats.org/markup-compatibility/2006" xmlns:mv="urn:schemas-microsoft-com:mac:vml" xmlns:c="http://schemas.openxmlformats.org/drawingml/2006/chart" xmlns:dgm="http://schemas.openxmlformats.org/drawingml/2006/diagram" xmlns:o="urn:schemas-microsoft-com:office:office" xmlns:v="urn:schemas-microsoft-com:vml" xmlns:pvml="urn:schemas-microsoft-com:office:powerpoint" xmlns:com="http://schemas.openxmlformats.org/drawingml/2006/compatibility" xmlns:p14="http://schemas.microsoft.com/office/powerpoint/2010/main" xmlns:p15="http://schemas.microsoft.com/office/powerpoint/2012/main" xmlns:ahyp="http://schemas.microsoft.com/office/drawing/2018/hyperlinkcolor" xmlns:go="http://customooxmlschemas.google.com/" r:id="rId28" roundtripDataSignature="AMtx7mihFzvj0a0a4pDfHA8Gtqtqz6tFDQ=="/>
     </p:ext>
   </p:extLst>
 </p:presentation>
@@ -4069,6 +4073,694 @@
     <p:extLst>
       <p:ext uri="{BB962C8B-B14F-4D97-AF65-F5344CB8AC3E}">
         <p14:creationId xmlns:p14="http://schemas.microsoft.com/office/powerpoint/2010/main" val="3605217608"/>
+      </p:ext>
+    </p:extLst>
+  </p:cSld>
+  <p:clrMapOvr>
+    <a:masterClrMapping/>
+  </p:clrMapOvr>
+</p:notes>
+</file>
+
+<file path=ppt/notesSlides/notesSlide22.xml><?xml version="1.0" encoding="utf-8"?>
+<p:notes xmlns:a="http://schemas.openxmlformats.org/drawingml/2006/main" xmlns:r="http://schemas.openxmlformats.org/officeDocument/2006/relationships" xmlns:p="http://schemas.openxmlformats.org/presentationml/2006/main" showMasterSp="0" showMasterPhAnim="0">
+  <p:cSld>
+    <p:spTree>
+      <p:nvGrpSpPr>
+        <p:cNvPr id="1" name="Shape 193"/>
+        <p:cNvGrpSpPr/>
+        <p:nvPr/>
+      </p:nvGrpSpPr>
+      <p:grpSpPr>
+        <a:xfrm>
+          <a:off x="0" y="0"/>
+          <a:ext cx="0" cy="0"/>
+          <a:chOff x="0" y="0"/>
+          <a:chExt cx="0" cy="0"/>
+        </a:xfrm>
+      </p:grpSpPr>
+      <p:sp>
+        <p:nvSpPr>
+          <p:cNvPr id="194" name="Google Shape;194;p10:notes"/>
+          <p:cNvSpPr txBox="1">
+            <a:spLocks noGrp="1"/>
+          </p:cNvSpPr>
+          <p:nvPr>
+            <p:ph type="body" idx="1"/>
+          </p:nvPr>
+        </p:nvSpPr>
+        <p:spPr>
+          <a:xfrm>
+            <a:off x="685800" y="4400550"/>
+            <a:ext cx="5486400" cy="3600450"/>
+          </a:xfrm>
+          <a:prstGeom prst="rect">
+            <a:avLst/>
+          </a:prstGeom>
+          <a:noFill/>
+          <a:ln>
+            <a:noFill/>
+          </a:ln>
+        </p:spPr>
+        <p:txBody>
+          <a:bodyPr spcFirstLastPara="1" wrap="square" lIns="91425" tIns="45700" rIns="91425" bIns="45700" anchor="t" anchorCtr="0">
+            <a:noAutofit/>
+          </a:bodyPr>
+          <a:lstStyle/>
+          <a:p>
+            <a:pPr marL="171450" lvl="0" indent="-171450" algn="l" rtl="0">
+              <a:lnSpc>
+                <a:spcPct val="100000"/>
+              </a:lnSpc>
+              <a:spcBef>
+                <a:spcPts val="0"/>
+              </a:spcBef>
+              <a:spcAft>
+                <a:spcPts val="0"/>
+              </a:spcAft>
+              <a:buSzPts val="1400"/>
+              <a:buFont typeface="Arial" panose="020B0604020202020204" pitchFamily="34" charset="0"/>
+              <a:buChar char="•"/>
+            </a:pPr>
+            <a:r>
+              <a:rPr lang="en-US" dirty="0"/>
+              <a:t>Single Domain and Competitive Analysis are stored in Graphite in two different namespaces</a:t>
+            </a:r>
+          </a:p>
+          <a:p>
+            <a:pPr marL="171450" lvl="0" indent="-171450" algn="l" rtl="0">
+              <a:lnSpc>
+                <a:spcPct val="100000"/>
+              </a:lnSpc>
+              <a:spcBef>
+                <a:spcPts val="0"/>
+              </a:spcBef>
+              <a:spcAft>
+                <a:spcPts val="0"/>
+              </a:spcAft>
+              <a:buSzPts val="1400"/>
+              <a:buFont typeface="Arial" panose="020B0604020202020204" pitchFamily="34" charset="0"/>
+              <a:buChar char="•"/>
+            </a:pPr>
+            <a:r>
+              <a:rPr lang="en-US" dirty="0"/>
+              <a:t>Complete flexibility in how tests are set up</a:t>
+            </a:r>
+          </a:p>
+          <a:p>
+            <a:pPr marL="171450" lvl="0" indent="-171450" algn="l" rtl="0">
+              <a:lnSpc>
+                <a:spcPct val="100000"/>
+              </a:lnSpc>
+              <a:spcBef>
+                <a:spcPts val="0"/>
+              </a:spcBef>
+              <a:spcAft>
+                <a:spcPts val="0"/>
+              </a:spcAft>
+              <a:buSzPts val="1400"/>
+              <a:buFont typeface="Arial" panose="020B0604020202020204" pitchFamily="34" charset="0"/>
+              <a:buChar char="•"/>
+            </a:pPr>
+            <a:r>
+              <a:rPr lang="en-US" dirty="0"/>
+              <a:t>Nothing set in stone about the number of single domain vs competitive analysis tests</a:t>
+            </a:r>
+            <a:endParaRPr dirty="0"/>
+          </a:p>
+        </p:txBody>
+      </p:sp>
+      <p:sp>
+        <p:nvSpPr>
+          <p:cNvPr id="195" name="Google Shape;195;p10:notes"/>
+          <p:cNvSpPr>
+            <a:spLocks noGrp="1" noRot="1" noChangeAspect="1"/>
+          </p:cNvSpPr>
+          <p:nvPr>
+            <p:ph type="sldImg" idx="2"/>
+          </p:nvPr>
+        </p:nvSpPr>
+        <p:spPr>
+          <a:xfrm>
+            <a:off x="685800" y="1143000"/>
+            <a:ext cx="5486400" cy="3086100"/>
+          </a:xfrm>
+          <a:custGeom>
+            <a:avLst/>
+            <a:gdLst/>
+            <a:ahLst/>
+            <a:cxnLst/>
+            <a:rect l="l" t="t" r="r" b="b"/>
+            <a:pathLst>
+              <a:path w="120000" h="120000" extrusionOk="0">
+                <a:moveTo>
+                  <a:pt x="0" y="0"/>
+                </a:moveTo>
+                <a:lnTo>
+                  <a:pt x="120000" y="0"/>
+                </a:lnTo>
+                <a:lnTo>
+                  <a:pt x="120000" y="120000"/>
+                </a:lnTo>
+                <a:lnTo>
+                  <a:pt x="0" y="120000"/>
+                </a:lnTo>
+                <a:close/>
+              </a:path>
+            </a:pathLst>
+          </a:custGeom>
+          <a:noFill/>
+          <a:ln w="12700" cap="flat" cmpd="sng">
+            <a:solidFill>
+              <a:srgbClr val="000000"/>
+            </a:solidFill>
+            <a:prstDash val="solid"/>
+            <a:round/>
+            <a:headEnd type="none" w="sm" len="sm"/>
+            <a:tailEnd type="none" w="sm" len="sm"/>
+          </a:ln>
+        </p:spPr>
+      </p:sp>
+    </p:spTree>
+    <p:extLst>
+      <p:ext uri="{BB962C8B-B14F-4D97-AF65-F5344CB8AC3E}">
+        <p14:creationId xmlns:p14="http://schemas.microsoft.com/office/powerpoint/2010/main" val="1270008764"/>
+      </p:ext>
+    </p:extLst>
+  </p:cSld>
+  <p:clrMapOvr>
+    <a:masterClrMapping/>
+  </p:clrMapOvr>
+</p:notes>
+</file>
+
+<file path=ppt/notesSlides/notesSlide23.xml><?xml version="1.0" encoding="utf-8"?>
+<p:notes xmlns:a="http://schemas.openxmlformats.org/drawingml/2006/main" xmlns:r="http://schemas.openxmlformats.org/officeDocument/2006/relationships" xmlns:p="http://schemas.openxmlformats.org/presentationml/2006/main" showMasterSp="0" showMasterPhAnim="0">
+  <p:cSld>
+    <p:spTree>
+      <p:nvGrpSpPr>
+        <p:cNvPr id="1" name="Shape 193"/>
+        <p:cNvGrpSpPr/>
+        <p:nvPr/>
+      </p:nvGrpSpPr>
+      <p:grpSpPr>
+        <a:xfrm>
+          <a:off x="0" y="0"/>
+          <a:ext cx="0" cy="0"/>
+          <a:chOff x="0" y="0"/>
+          <a:chExt cx="0" cy="0"/>
+        </a:xfrm>
+      </p:grpSpPr>
+      <p:sp>
+        <p:nvSpPr>
+          <p:cNvPr id="194" name="Google Shape;194;p10:notes"/>
+          <p:cNvSpPr txBox="1">
+            <a:spLocks noGrp="1"/>
+          </p:cNvSpPr>
+          <p:nvPr>
+            <p:ph type="body" idx="1"/>
+          </p:nvPr>
+        </p:nvSpPr>
+        <p:spPr>
+          <a:xfrm>
+            <a:off x="685800" y="4400550"/>
+            <a:ext cx="5486400" cy="3600450"/>
+          </a:xfrm>
+          <a:prstGeom prst="rect">
+            <a:avLst/>
+          </a:prstGeom>
+          <a:noFill/>
+          <a:ln>
+            <a:noFill/>
+          </a:ln>
+        </p:spPr>
+        <p:txBody>
+          <a:bodyPr spcFirstLastPara="1" wrap="square" lIns="91425" tIns="45700" rIns="91425" bIns="45700" anchor="t" anchorCtr="0">
+            <a:noAutofit/>
+          </a:bodyPr>
+          <a:lstStyle/>
+          <a:p>
+            <a:pPr marL="171450" lvl="0" indent="-171450" algn="l" rtl="0">
+              <a:lnSpc>
+                <a:spcPct val="100000"/>
+              </a:lnSpc>
+              <a:spcBef>
+                <a:spcPts val="0"/>
+              </a:spcBef>
+              <a:spcAft>
+                <a:spcPts val="0"/>
+              </a:spcAft>
+              <a:buSzPts val="1400"/>
+              <a:buFont typeface="Arial" panose="020B0604020202020204" pitchFamily="34" charset="0"/>
+              <a:buChar char="•"/>
+            </a:pPr>
+            <a:r>
+              <a:rPr lang="en-US" dirty="0"/>
+              <a:t>Single Domain and Competitive Analysis are stored in Graphite in two different namespaces</a:t>
+            </a:r>
+          </a:p>
+          <a:p>
+            <a:pPr marL="171450" lvl="0" indent="-171450" algn="l" rtl="0">
+              <a:lnSpc>
+                <a:spcPct val="100000"/>
+              </a:lnSpc>
+              <a:spcBef>
+                <a:spcPts val="0"/>
+              </a:spcBef>
+              <a:spcAft>
+                <a:spcPts val="0"/>
+              </a:spcAft>
+              <a:buSzPts val="1400"/>
+              <a:buFont typeface="Arial" panose="020B0604020202020204" pitchFamily="34" charset="0"/>
+              <a:buChar char="•"/>
+            </a:pPr>
+            <a:r>
+              <a:rPr lang="en-US" dirty="0"/>
+              <a:t>Complete flexibility in how tests are set up</a:t>
+            </a:r>
+          </a:p>
+          <a:p>
+            <a:pPr marL="171450" lvl="0" indent="-171450" algn="l" rtl="0">
+              <a:lnSpc>
+                <a:spcPct val="100000"/>
+              </a:lnSpc>
+              <a:spcBef>
+                <a:spcPts val="0"/>
+              </a:spcBef>
+              <a:spcAft>
+                <a:spcPts val="0"/>
+              </a:spcAft>
+              <a:buSzPts val="1400"/>
+              <a:buFont typeface="Arial" panose="020B0604020202020204" pitchFamily="34" charset="0"/>
+              <a:buChar char="•"/>
+            </a:pPr>
+            <a:r>
+              <a:rPr lang="en-US" dirty="0"/>
+              <a:t>Nothing set in stone about the number of single domain vs competitive analysis tests</a:t>
+            </a:r>
+            <a:endParaRPr dirty="0"/>
+          </a:p>
+        </p:txBody>
+      </p:sp>
+      <p:sp>
+        <p:nvSpPr>
+          <p:cNvPr id="195" name="Google Shape;195;p10:notes"/>
+          <p:cNvSpPr>
+            <a:spLocks noGrp="1" noRot="1" noChangeAspect="1"/>
+          </p:cNvSpPr>
+          <p:nvPr>
+            <p:ph type="sldImg" idx="2"/>
+          </p:nvPr>
+        </p:nvSpPr>
+        <p:spPr>
+          <a:xfrm>
+            <a:off x="685800" y="1143000"/>
+            <a:ext cx="5486400" cy="3086100"/>
+          </a:xfrm>
+          <a:custGeom>
+            <a:avLst/>
+            <a:gdLst/>
+            <a:ahLst/>
+            <a:cxnLst/>
+            <a:rect l="l" t="t" r="r" b="b"/>
+            <a:pathLst>
+              <a:path w="120000" h="120000" extrusionOk="0">
+                <a:moveTo>
+                  <a:pt x="0" y="0"/>
+                </a:moveTo>
+                <a:lnTo>
+                  <a:pt x="120000" y="0"/>
+                </a:lnTo>
+                <a:lnTo>
+                  <a:pt x="120000" y="120000"/>
+                </a:lnTo>
+                <a:lnTo>
+                  <a:pt x="0" y="120000"/>
+                </a:lnTo>
+                <a:close/>
+              </a:path>
+            </a:pathLst>
+          </a:custGeom>
+          <a:noFill/>
+          <a:ln w="12700" cap="flat" cmpd="sng">
+            <a:solidFill>
+              <a:srgbClr val="000000"/>
+            </a:solidFill>
+            <a:prstDash val="solid"/>
+            <a:round/>
+            <a:headEnd type="none" w="sm" len="sm"/>
+            <a:tailEnd type="none" w="sm" len="sm"/>
+          </a:ln>
+        </p:spPr>
+      </p:sp>
+    </p:spTree>
+    <p:extLst>
+      <p:ext uri="{BB962C8B-B14F-4D97-AF65-F5344CB8AC3E}">
+        <p14:creationId xmlns:p14="http://schemas.microsoft.com/office/powerpoint/2010/main" val="2263168695"/>
+      </p:ext>
+    </p:extLst>
+  </p:cSld>
+  <p:clrMapOvr>
+    <a:masterClrMapping/>
+  </p:clrMapOvr>
+</p:notes>
+</file>
+
+<file path=ppt/notesSlides/notesSlide24.xml><?xml version="1.0" encoding="utf-8"?>
+<p:notes xmlns:a="http://schemas.openxmlformats.org/drawingml/2006/main" xmlns:r="http://schemas.openxmlformats.org/officeDocument/2006/relationships" xmlns:p="http://schemas.openxmlformats.org/presentationml/2006/main" showMasterSp="0" showMasterPhAnim="0">
+  <p:cSld>
+    <p:spTree>
+      <p:nvGrpSpPr>
+        <p:cNvPr id="1" name="Shape 193"/>
+        <p:cNvGrpSpPr/>
+        <p:nvPr/>
+      </p:nvGrpSpPr>
+      <p:grpSpPr>
+        <a:xfrm>
+          <a:off x="0" y="0"/>
+          <a:ext cx="0" cy="0"/>
+          <a:chOff x="0" y="0"/>
+          <a:chExt cx="0" cy="0"/>
+        </a:xfrm>
+      </p:grpSpPr>
+      <p:sp>
+        <p:nvSpPr>
+          <p:cNvPr id="194" name="Google Shape;194;p10:notes"/>
+          <p:cNvSpPr txBox="1">
+            <a:spLocks noGrp="1"/>
+          </p:cNvSpPr>
+          <p:nvPr>
+            <p:ph type="body" idx="1"/>
+          </p:nvPr>
+        </p:nvSpPr>
+        <p:spPr>
+          <a:xfrm>
+            <a:off x="685800" y="4400550"/>
+            <a:ext cx="5486400" cy="3600450"/>
+          </a:xfrm>
+          <a:prstGeom prst="rect">
+            <a:avLst/>
+          </a:prstGeom>
+          <a:noFill/>
+          <a:ln>
+            <a:noFill/>
+          </a:ln>
+        </p:spPr>
+        <p:txBody>
+          <a:bodyPr spcFirstLastPara="1" wrap="square" lIns="91425" tIns="45700" rIns="91425" bIns="45700" anchor="t" anchorCtr="0">
+            <a:noAutofit/>
+          </a:bodyPr>
+          <a:lstStyle/>
+          <a:p>
+            <a:pPr marL="171450" lvl="0" indent="-171450" algn="l" rtl="0">
+              <a:lnSpc>
+                <a:spcPct val="100000"/>
+              </a:lnSpc>
+              <a:spcBef>
+                <a:spcPts val="0"/>
+              </a:spcBef>
+              <a:spcAft>
+                <a:spcPts val="0"/>
+              </a:spcAft>
+              <a:buSzPts val="1400"/>
+              <a:buFont typeface="Arial" panose="020B0604020202020204" pitchFamily="34" charset="0"/>
+              <a:buChar char="•"/>
+            </a:pPr>
+            <a:r>
+              <a:rPr lang="en-US" dirty="0"/>
+              <a:t>Single Domain and Competitive Analysis are stored in Graphite in two different namespaces</a:t>
+            </a:r>
+          </a:p>
+          <a:p>
+            <a:pPr marL="171450" lvl="0" indent="-171450" algn="l" rtl="0">
+              <a:lnSpc>
+                <a:spcPct val="100000"/>
+              </a:lnSpc>
+              <a:spcBef>
+                <a:spcPts val="0"/>
+              </a:spcBef>
+              <a:spcAft>
+                <a:spcPts val="0"/>
+              </a:spcAft>
+              <a:buSzPts val="1400"/>
+              <a:buFont typeface="Arial" panose="020B0604020202020204" pitchFamily="34" charset="0"/>
+              <a:buChar char="•"/>
+            </a:pPr>
+            <a:r>
+              <a:rPr lang="en-US" dirty="0"/>
+              <a:t>Complete flexibility in how tests are set up</a:t>
+            </a:r>
+          </a:p>
+          <a:p>
+            <a:pPr marL="171450" lvl="0" indent="-171450" algn="l" rtl="0">
+              <a:lnSpc>
+                <a:spcPct val="100000"/>
+              </a:lnSpc>
+              <a:spcBef>
+                <a:spcPts val="0"/>
+              </a:spcBef>
+              <a:spcAft>
+                <a:spcPts val="0"/>
+              </a:spcAft>
+              <a:buSzPts val="1400"/>
+              <a:buFont typeface="Arial" panose="020B0604020202020204" pitchFamily="34" charset="0"/>
+              <a:buChar char="•"/>
+            </a:pPr>
+            <a:r>
+              <a:rPr lang="en-US" dirty="0"/>
+              <a:t>Nothing set in stone about the number of single domain vs competitive analysis tests</a:t>
+            </a:r>
+            <a:endParaRPr dirty="0"/>
+          </a:p>
+        </p:txBody>
+      </p:sp>
+      <p:sp>
+        <p:nvSpPr>
+          <p:cNvPr id="195" name="Google Shape;195;p10:notes"/>
+          <p:cNvSpPr>
+            <a:spLocks noGrp="1" noRot="1" noChangeAspect="1"/>
+          </p:cNvSpPr>
+          <p:nvPr>
+            <p:ph type="sldImg" idx="2"/>
+          </p:nvPr>
+        </p:nvSpPr>
+        <p:spPr>
+          <a:xfrm>
+            <a:off x="685800" y="1143000"/>
+            <a:ext cx="5486400" cy="3086100"/>
+          </a:xfrm>
+          <a:custGeom>
+            <a:avLst/>
+            <a:gdLst/>
+            <a:ahLst/>
+            <a:cxnLst/>
+            <a:rect l="l" t="t" r="r" b="b"/>
+            <a:pathLst>
+              <a:path w="120000" h="120000" extrusionOk="0">
+                <a:moveTo>
+                  <a:pt x="0" y="0"/>
+                </a:moveTo>
+                <a:lnTo>
+                  <a:pt x="120000" y="0"/>
+                </a:lnTo>
+                <a:lnTo>
+                  <a:pt x="120000" y="120000"/>
+                </a:lnTo>
+                <a:lnTo>
+                  <a:pt x="0" y="120000"/>
+                </a:lnTo>
+                <a:close/>
+              </a:path>
+            </a:pathLst>
+          </a:custGeom>
+          <a:noFill/>
+          <a:ln w="12700" cap="flat" cmpd="sng">
+            <a:solidFill>
+              <a:srgbClr val="000000"/>
+            </a:solidFill>
+            <a:prstDash val="solid"/>
+            <a:round/>
+            <a:headEnd type="none" w="sm" len="sm"/>
+            <a:tailEnd type="none" w="sm" len="sm"/>
+          </a:ln>
+        </p:spPr>
+      </p:sp>
+    </p:spTree>
+    <p:extLst>
+      <p:ext uri="{BB962C8B-B14F-4D97-AF65-F5344CB8AC3E}">
+        <p14:creationId xmlns:p14="http://schemas.microsoft.com/office/powerpoint/2010/main" val="2604551089"/>
+      </p:ext>
+    </p:extLst>
+  </p:cSld>
+  <p:clrMapOvr>
+    <a:masterClrMapping/>
+  </p:clrMapOvr>
+</p:notes>
+</file>
+
+<file path=ppt/notesSlides/notesSlide25.xml><?xml version="1.0" encoding="utf-8"?>
+<p:notes xmlns:a="http://schemas.openxmlformats.org/drawingml/2006/main" xmlns:r="http://schemas.openxmlformats.org/officeDocument/2006/relationships" xmlns:p="http://schemas.openxmlformats.org/presentationml/2006/main" showMasterSp="0" showMasterPhAnim="0">
+  <p:cSld>
+    <p:spTree>
+      <p:nvGrpSpPr>
+        <p:cNvPr id="1" name="Shape 193"/>
+        <p:cNvGrpSpPr/>
+        <p:nvPr/>
+      </p:nvGrpSpPr>
+      <p:grpSpPr>
+        <a:xfrm>
+          <a:off x="0" y="0"/>
+          <a:ext cx="0" cy="0"/>
+          <a:chOff x="0" y="0"/>
+          <a:chExt cx="0" cy="0"/>
+        </a:xfrm>
+      </p:grpSpPr>
+      <p:sp>
+        <p:nvSpPr>
+          <p:cNvPr id="194" name="Google Shape;194;p10:notes"/>
+          <p:cNvSpPr txBox="1">
+            <a:spLocks noGrp="1"/>
+          </p:cNvSpPr>
+          <p:nvPr>
+            <p:ph type="body" idx="1"/>
+          </p:nvPr>
+        </p:nvSpPr>
+        <p:spPr>
+          <a:xfrm>
+            <a:off x="685800" y="4400550"/>
+            <a:ext cx="5486400" cy="3600450"/>
+          </a:xfrm>
+          <a:prstGeom prst="rect">
+            <a:avLst/>
+          </a:prstGeom>
+          <a:noFill/>
+          <a:ln>
+            <a:noFill/>
+          </a:ln>
+        </p:spPr>
+        <p:txBody>
+          <a:bodyPr spcFirstLastPara="1" wrap="square" lIns="91425" tIns="45700" rIns="91425" bIns="45700" anchor="t" anchorCtr="0">
+            <a:noAutofit/>
+          </a:bodyPr>
+          <a:lstStyle/>
+          <a:p>
+            <a:pPr marL="171450" lvl="0" indent="-171450" algn="l" rtl="0">
+              <a:lnSpc>
+                <a:spcPct val="100000"/>
+              </a:lnSpc>
+              <a:spcBef>
+                <a:spcPts val="0"/>
+              </a:spcBef>
+              <a:spcAft>
+                <a:spcPts val="0"/>
+              </a:spcAft>
+              <a:buSzPts val="1400"/>
+              <a:buFont typeface="Arial" panose="020B0604020202020204" pitchFamily="34" charset="0"/>
+              <a:buChar char="•"/>
+            </a:pPr>
+            <a:r>
+              <a:rPr lang="en-US" dirty="0"/>
+              <a:t>Single Domain and Competitive Analysis are stored in Graphite in two different namespaces</a:t>
+            </a:r>
+          </a:p>
+          <a:p>
+            <a:pPr marL="171450" lvl="0" indent="-171450" algn="l" rtl="0">
+              <a:lnSpc>
+                <a:spcPct val="100000"/>
+              </a:lnSpc>
+              <a:spcBef>
+                <a:spcPts val="0"/>
+              </a:spcBef>
+              <a:spcAft>
+                <a:spcPts val="0"/>
+              </a:spcAft>
+              <a:buSzPts val="1400"/>
+              <a:buFont typeface="Arial" panose="020B0604020202020204" pitchFamily="34" charset="0"/>
+              <a:buChar char="•"/>
+            </a:pPr>
+            <a:r>
+              <a:rPr lang="en-US" dirty="0"/>
+              <a:t>Complete flexibility in how tests are set up</a:t>
+            </a:r>
+          </a:p>
+          <a:p>
+            <a:pPr marL="171450" lvl="0" indent="-171450" algn="l" rtl="0">
+              <a:lnSpc>
+                <a:spcPct val="100000"/>
+              </a:lnSpc>
+              <a:spcBef>
+                <a:spcPts val="0"/>
+              </a:spcBef>
+              <a:spcAft>
+                <a:spcPts val="0"/>
+              </a:spcAft>
+              <a:buSzPts val="1400"/>
+              <a:buFont typeface="Arial" panose="020B0604020202020204" pitchFamily="34" charset="0"/>
+              <a:buChar char="•"/>
+            </a:pPr>
+            <a:r>
+              <a:rPr lang="en-US" dirty="0"/>
+              <a:t>Nothing set in stone about the number of single domain vs competitive analysis tests</a:t>
+            </a:r>
+            <a:endParaRPr dirty="0"/>
+          </a:p>
+        </p:txBody>
+      </p:sp>
+      <p:sp>
+        <p:nvSpPr>
+          <p:cNvPr id="195" name="Google Shape;195;p10:notes"/>
+          <p:cNvSpPr>
+            <a:spLocks noGrp="1" noRot="1" noChangeAspect="1"/>
+          </p:cNvSpPr>
+          <p:nvPr>
+            <p:ph type="sldImg" idx="2"/>
+          </p:nvPr>
+        </p:nvSpPr>
+        <p:spPr>
+          <a:xfrm>
+            <a:off x="685800" y="1143000"/>
+            <a:ext cx="5486400" cy="3086100"/>
+          </a:xfrm>
+          <a:custGeom>
+            <a:avLst/>
+            <a:gdLst/>
+            <a:ahLst/>
+            <a:cxnLst/>
+            <a:rect l="l" t="t" r="r" b="b"/>
+            <a:pathLst>
+              <a:path w="120000" h="120000" extrusionOk="0">
+                <a:moveTo>
+                  <a:pt x="0" y="0"/>
+                </a:moveTo>
+                <a:lnTo>
+                  <a:pt x="120000" y="0"/>
+                </a:lnTo>
+                <a:lnTo>
+                  <a:pt x="120000" y="120000"/>
+                </a:lnTo>
+                <a:lnTo>
+                  <a:pt x="0" y="120000"/>
+                </a:lnTo>
+                <a:close/>
+              </a:path>
+            </a:pathLst>
+          </a:custGeom>
+          <a:noFill/>
+          <a:ln w="12700" cap="flat" cmpd="sng">
+            <a:solidFill>
+              <a:srgbClr val="000000"/>
+            </a:solidFill>
+            <a:prstDash val="solid"/>
+            <a:round/>
+            <a:headEnd type="none" w="sm" len="sm"/>
+            <a:tailEnd type="none" w="sm" len="sm"/>
+          </a:ln>
+        </p:spPr>
+      </p:sp>
+    </p:spTree>
+    <p:extLst>
+      <p:ext uri="{BB962C8B-B14F-4D97-AF65-F5344CB8AC3E}">
+        <p14:creationId xmlns:p14="http://schemas.microsoft.com/office/powerpoint/2010/main" val="4096997019"/>
       </p:ext>
     </p:extLst>
   </p:cSld>
@@ -14154,7 +14846,7 @@
                 </a:solidFill>
                 <a:latin typeface="Avenir Medium" panose="02000503020000020003" pitchFamily="2" charset="0"/>
               </a:rPr>
-              <a:t>There are no passwords used for any communication for any server</a:t>
+              <a:t>There are no passwords used for communication with any server</a:t>
             </a:r>
           </a:p>
           <a:p>
@@ -15116,27 +15808,7 @@
                 <a:latin typeface="Avenir Medium" panose="02000503020000020003" pitchFamily="2" charset="0"/>
                 <a:cs typeface="Courier New" panose="02070309020205020404" pitchFamily="49" charset="0"/>
               </a:rPr>
-              <a:t>The following steps should be </a:t>
-            </a:r>
-            <a:r>
-              <a:rPr lang="en-US" sz="1800" spc="-60">
-                <a:solidFill>
-                  <a:srgbClr val="383838"/>
-                </a:solidFill>
-                <a:latin typeface="Avenir Medium" panose="02000503020000020003" pitchFamily="2" charset="0"/>
-                <a:cs typeface="Courier New" panose="02070309020205020404" pitchFamily="49" charset="0"/>
-              </a:rPr>
-              <a:t>done on </a:t>
-            </a:r>
-            <a:r>
-              <a:rPr lang="en-US" sz="1800" spc="-60" dirty="0">
-                <a:solidFill>
-                  <a:srgbClr val="383838"/>
-                </a:solidFill>
-                <a:latin typeface="Avenir Medium" panose="02000503020000020003" pitchFamily="2" charset="0"/>
-                <a:cs typeface="Courier New" panose="02070309020205020404" pitchFamily="49" charset="0"/>
-              </a:rPr>
-              <a:t>the Graphite/Grafana server</a:t>
+              <a:t>The following steps should be done on the Graphite/Grafana server</a:t>
             </a:r>
           </a:p>
           <a:p>
@@ -15653,6 +16325,3539 @@
     <p:extLst>
       <p:ext uri="{BB962C8B-B14F-4D97-AF65-F5344CB8AC3E}">
         <p14:creationId xmlns:p14="http://schemas.microsoft.com/office/powerpoint/2010/main" val="3438005598"/>
+      </p:ext>
+    </p:extLst>
+  </p:cSld>
+  <p:clrMapOvr>
+    <a:masterClrMapping/>
+  </p:clrMapOvr>
+</p:sld>
+</file>
+
+<file path=ppt/slides/slide22.xml><?xml version="1.0" encoding="utf-8"?>
+<p:sld xmlns:a="http://schemas.openxmlformats.org/drawingml/2006/main" xmlns:r="http://schemas.openxmlformats.org/officeDocument/2006/relationships" xmlns:p="http://schemas.openxmlformats.org/presentationml/2006/main">
+  <p:cSld>
+    <p:spTree>
+      <p:nvGrpSpPr>
+        <p:cNvPr id="1" name="Shape 196"/>
+        <p:cNvGrpSpPr/>
+        <p:nvPr/>
+      </p:nvGrpSpPr>
+      <p:grpSpPr>
+        <a:xfrm>
+          <a:off x="0" y="0"/>
+          <a:ext cx="0" cy="0"/>
+          <a:chOff x="0" y="0"/>
+          <a:chExt cx="0" cy="0"/>
+        </a:xfrm>
+      </p:grpSpPr>
+      <p:sp>
+        <p:nvSpPr>
+          <p:cNvPr id="197" name="Google Shape;197;p10"/>
+          <p:cNvSpPr txBox="1">
+            <a:spLocks noGrp="1"/>
+          </p:cNvSpPr>
+          <p:nvPr>
+            <p:ph type="title"/>
+          </p:nvPr>
+        </p:nvSpPr>
+        <p:spPr>
+          <a:xfrm>
+            <a:off x="540000" y="540001"/>
+            <a:ext cx="9230301" cy="588712"/>
+          </a:xfrm>
+          <a:prstGeom prst="rect">
+            <a:avLst/>
+          </a:prstGeom>
+          <a:noFill/>
+          <a:ln>
+            <a:noFill/>
+          </a:ln>
+        </p:spPr>
+        <p:txBody>
+          <a:bodyPr spcFirstLastPara="1" wrap="square" lIns="0" tIns="0" rIns="0" bIns="0" anchor="t" anchorCtr="0">
+            <a:noAutofit/>
+          </a:bodyPr>
+          <a:lstStyle/>
+          <a:p>
+            <a:pPr marL="0" lvl="0" indent="0" algn="l" rtl="0">
+              <a:lnSpc>
+                <a:spcPct val="90000"/>
+              </a:lnSpc>
+              <a:spcBef>
+                <a:spcPts val="0"/>
+              </a:spcBef>
+              <a:spcAft>
+                <a:spcPts val="0"/>
+              </a:spcAft>
+              <a:buClr>
+                <a:srgbClr val="0099CC"/>
+              </a:buClr>
+              <a:buSzPts val="3600"/>
+              <a:buFont typeface="Arial"/>
+              <a:buNone/>
+            </a:pPr>
+            <a:r>
+              <a:rPr lang="en-US" b="0" dirty="0">
+                <a:latin typeface="Avenir Medium" panose="02000503020000020003" pitchFamily="2" charset="0"/>
+              </a:rPr>
+              <a:t>Implementing an External Storage Volume</a:t>
+            </a:r>
+            <a:endParaRPr b="0" dirty="0">
+              <a:latin typeface="Avenir Medium" panose="02000503020000020003" pitchFamily="2" charset="0"/>
+            </a:endParaRPr>
+          </a:p>
+        </p:txBody>
+      </p:sp>
+      <p:sp>
+        <p:nvSpPr>
+          <p:cNvPr id="14" name="Google Shape;198;p10">
+            <a:extLst>
+              <a:ext uri="{FF2B5EF4-FFF2-40B4-BE49-F238E27FC236}">
+                <a16:creationId xmlns:a16="http://schemas.microsoft.com/office/drawing/2014/main" id="{ADF47C86-3730-8F43-AF64-4FD21181E7A8}"/>
+              </a:ext>
+            </a:extLst>
+          </p:cNvPr>
+          <p:cNvSpPr txBox="1">
+            <a:spLocks noGrp="1"/>
+          </p:cNvSpPr>
+          <p:nvPr>
+            <p:ph type="body" idx="1"/>
+          </p:nvPr>
+        </p:nvSpPr>
+        <p:spPr>
+          <a:xfrm>
+            <a:off x="540000" y="1128713"/>
+            <a:ext cx="11310624" cy="5345239"/>
+          </a:xfrm>
+          <a:prstGeom prst="rect">
+            <a:avLst/>
+          </a:prstGeom>
+          <a:noFill/>
+          <a:ln>
+            <a:noFill/>
+          </a:ln>
+        </p:spPr>
+        <p:txBody>
+          <a:bodyPr spcFirstLastPara="1" wrap="square" lIns="0" tIns="0" rIns="0" bIns="0" anchor="t" anchorCtr="0">
+            <a:noAutofit/>
+          </a:bodyPr>
+          <a:lstStyle/>
+          <a:p>
+            <a:pPr marL="298449" marR="5079" indent="-285750">
+              <a:lnSpc>
+                <a:spcPct val="100000"/>
+              </a:lnSpc>
+              <a:spcBef>
+                <a:spcPts val="0"/>
+              </a:spcBef>
+              <a:spcAft>
+                <a:spcPts val="1200"/>
+              </a:spcAft>
+              <a:buFont typeface="Arial" panose="020B0604020202020204" pitchFamily="34" charset="0"/>
+              <a:buChar char="•"/>
+            </a:pPr>
+            <a:r>
+              <a:rPr lang="en-US" sz="1800" spc="-60" dirty="0">
+                <a:solidFill>
+                  <a:srgbClr val="383838"/>
+                </a:solidFill>
+                <a:latin typeface="Avenir Medium" panose="02000503020000020003" pitchFamily="2" charset="0"/>
+                <a:cs typeface="Courier New" panose="02070309020205020404" pitchFamily="49" charset="0"/>
+              </a:rPr>
+              <a:t>The default location of the Graphite database on the Graphite/Grafana server is </a:t>
+            </a:r>
+            <a:r>
+              <a:rPr lang="en-US" sz="1800" spc="-60" dirty="0">
+                <a:solidFill>
+                  <a:srgbClr val="383838"/>
+                </a:solidFill>
+                <a:latin typeface="Courier New" panose="02070309020205020404" pitchFamily="49" charset="0"/>
+                <a:cs typeface="Courier New" panose="02070309020205020404" pitchFamily="49" charset="0"/>
+              </a:rPr>
+              <a:t>/</a:t>
+            </a:r>
+            <a:r>
+              <a:rPr lang="en-US" sz="1800" spc="-60" dirty="0" err="1">
+                <a:solidFill>
+                  <a:srgbClr val="383838"/>
+                </a:solidFill>
+                <a:latin typeface="Courier New" panose="02070309020205020404" pitchFamily="49" charset="0"/>
+                <a:cs typeface="Courier New" panose="02070309020205020404" pitchFamily="49" charset="0"/>
+              </a:rPr>
+              <a:t>usr</a:t>
+            </a:r>
+            <a:r>
+              <a:rPr lang="en-US" sz="1800" spc="-60" dirty="0">
+                <a:solidFill>
+                  <a:srgbClr val="383838"/>
+                </a:solidFill>
+                <a:latin typeface="Courier New" panose="02070309020205020404" pitchFamily="49" charset="0"/>
+                <a:cs typeface="Courier New" panose="02070309020205020404" pitchFamily="49" charset="0"/>
+              </a:rPr>
+              <a:t>/local/graphite </a:t>
+            </a:r>
+          </a:p>
+          <a:p>
+            <a:pPr marL="298449" marR="5079" indent="-285750">
+              <a:lnSpc>
+                <a:spcPct val="100000"/>
+              </a:lnSpc>
+              <a:spcBef>
+                <a:spcPts val="0"/>
+              </a:spcBef>
+              <a:spcAft>
+                <a:spcPts val="1200"/>
+              </a:spcAft>
+              <a:buFont typeface="Arial" panose="020B0604020202020204" pitchFamily="34" charset="0"/>
+              <a:buChar char="•"/>
+            </a:pPr>
+            <a:r>
+              <a:rPr lang="en-US" sz="1800" spc="-60" dirty="0">
+                <a:solidFill>
+                  <a:srgbClr val="383838"/>
+                </a:solidFill>
+                <a:latin typeface="Avenir Medium" panose="02000503020000020003" pitchFamily="2" charset="0"/>
+                <a:cs typeface="Courier New" panose="02070309020205020404" pitchFamily="49" charset="0"/>
+              </a:rPr>
+              <a:t>Depending on the required data retention period, it may be necessary to create an external Linode volume that is large enough to store large amounts of data</a:t>
+            </a:r>
+          </a:p>
+          <a:p>
+            <a:pPr marL="298449" marR="5079" indent="-285750">
+              <a:lnSpc>
+                <a:spcPct val="100000"/>
+              </a:lnSpc>
+              <a:spcBef>
+                <a:spcPts val="0"/>
+              </a:spcBef>
+              <a:spcAft>
+                <a:spcPts val="1200"/>
+              </a:spcAft>
+              <a:buFont typeface="Arial" panose="020B0604020202020204" pitchFamily="34" charset="0"/>
+              <a:buChar char="•"/>
+            </a:pPr>
+            <a:r>
+              <a:rPr lang="en-US" sz="1800" spc="-60" dirty="0">
+                <a:solidFill>
+                  <a:srgbClr val="383838"/>
+                </a:solidFill>
+                <a:latin typeface="Avenir Medium" panose="02000503020000020003" pitchFamily="2" charset="0"/>
+                <a:cs typeface="Courier New" panose="02070309020205020404" pitchFamily="49" charset="0"/>
+              </a:rPr>
+              <a:t>Use the Linode Console Manager to add an external storage volume</a:t>
+            </a:r>
+          </a:p>
+          <a:p>
+            <a:pPr marL="755649" marR="5079" lvl="1" indent="-285750">
+              <a:lnSpc>
+                <a:spcPct val="100000"/>
+              </a:lnSpc>
+              <a:spcBef>
+                <a:spcPts val="0"/>
+              </a:spcBef>
+              <a:buFont typeface="Arial" panose="020B0604020202020204" pitchFamily="34" charset="0"/>
+              <a:buChar char="•"/>
+            </a:pPr>
+            <a:r>
+              <a:rPr lang="en-US" sz="1800" spc="-60" dirty="0">
+                <a:solidFill>
+                  <a:srgbClr val="383838"/>
+                </a:solidFill>
+                <a:latin typeface="Avenir Medium" panose="02000503020000020003" pitchFamily="2" charset="0"/>
+                <a:cs typeface="Courier New" panose="02070309020205020404" pitchFamily="49" charset="0"/>
+              </a:rPr>
+              <a:t>The minimum recommended size is 2TB</a:t>
+            </a:r>
+          </a:p>
+          <a:p>
+            <a:pPr marL="755649" marR="5079" lvl="1" indent="-285750">
+              <a:lnSpc>
+                <a:spcPct val="100000"/>
+              </a:lnSpc>
+              <a:spcBef>
+                <a:spcPts val="0"/>
+              </a:spcBef>
+              <a:spcAft>
+                <a:spcPts val="1200"/>
+              </a:spcAft>
+              <a:buFont typeface="Arial" panose="020B0604020202020204" pitchFamily="34" charset="0"/>
+              <a:buChar char="•"/>
+            </a:pPr>
+            <a:r>
+              <a:rPr lang="en-US" sz="1800" spc="-60" dirty="0">
+                <a:solidFill>
+                  <a:srgbClr val="383838"/>
+                </a:solidFill>
+                <a:latin typeface="Avenir Medium" panose="02000503020000020003" pitchFamily="2" charset="0"/>
+                <a:cs typeface="Courier New" panose="02070309020205020404" pitchFamily="49" charset="0"/>
+              </a:rPr>
+              <a:t>Once the volume exists, it can be resized</a:t>
+            </a:r>
+          </a:p>
+          <a:p>
+            <a:pPr marL="298449" marR="5079" indent="-285750">
+              <a:lnSpc>
+                <a:spcPct val="100000"/>
+              </a:lnSpc>
+              <a:spcBef>
+                <a:spcPts val="0"/>
+              </a:spcBef>
+              <a:spcAft>
+                <a:spcPts val="1200"/>
+              </a:spcAft>
+              <a:buFont typeface="Arial" panose="020B0604020202020204" pitchFamily="34" charset="0"/>
+              <a:buChar char="•"/>
+            </a:pPr>
+            <a:r>
+              <a:rPr lang="en-US" sz="1800" spc="-60" dirty="0">
+                <a:solidFill>
+                  <a:srgbClr val="383838"/>
+                </a:solidFill>
+                <a:latin typeface="Avenir Medium" panose="02000503020000020003" pitchFamily="2" charset="0"/>
+                <a:cs typeface="Courier New" panose="02070309020205020404" pitchFamily="49" charset="0"/>
+              </a:rPr>
+              <a:t>Use the following steps to move the existing Graphite database to the newly created Linode volume</a:t>
+            </a:r>
+          </a:p>
+          <a:p>
+            <a:pPr marL="755649" marR="5079" lvl="1" indent="-285750">
+              <a:lnSpc>
+                <a:spcPct val="100000"/>
+              </a:lnSpc>
+              <a:spcBef>
+                <a:spcPts val="0"/>
+              </a:spcBef>
+              <a:buFont typeface="Arial" panose="020B0604020202020204" pitchFamily="34" charset="0"/>
+              <a:buChar char="•"/>
+            </a:pPr>
+            <a:r>
+              <a:rPr lang="en-US" sz="1800" spc="-60" dirty="0">
+                <a:solidFill>
+                  <a:srgbClr val="383838"/>
+                </a:solidFill>
+                <a:latin typeface="Avenir Medium" panose="02000503020000020003" pitchFamily="2" charset="0"/>
+                <a:cs typeface="Courier New" panose="02070309020205020404" pitchFamily="49" charset="0"/>
+              </a:rPr>
+              <a:t>For illustration purposes, the new volume will be mounted at </a:t>
+            </a:r>
+            <a:r>
+              <a:rPr lang="en-US" sz="1800" spc="-60" dirty="0">
+                <a:solidFill>
+                  <a:srgbClr val="383838"/>
+                </a:solidFill>
+                <a:latin typeface="Courier New" panose="02070309020205020404" pitchFamily="49" charset="0"/>
+                <a:cs typeface="Courier New" panose="02070309020205020404" pitchFamily="49" charset="0"/>
+              </a:rPr>
+              <a:t>/</a:t>
+            </a:r>
+            <a:r>
+              <a:rPr lang="en-US" sz="1800" spc="-60" dirty="0" err="1">
+                <a:solidFill>
+                  <a:srgbClr val="383838"/>
+                </a:solidFill>
+                <a:latin typeface="Courier New" panose="02070309020205020404" pitchFamily="49" charset="0"/>
+                <a:cs typeface="Courier New" panose="02070309020205020404" pitchFamily="49" charset="0"/>
+              </a:rPr>
+              <a:t>mnt</a:t>
+            </a:r>
+            <a:r>
+              <a:rPr lang="en-US" sz="1800" spc="-60" dirty="0">
+                <a:solidFill>
+                  <a:srgbClr val="383838"/>
+                </a:solidFill>
+                <a:latin typeface="Courier New" panose="02070309020205020404" pitchFamily="49" charset="0"/>
+                <a:cs typeface="Courier New" panose="02070309020205020404" pitchFamily="49" charset="0"/>
+              </a:rPr>
+              <a:t>/data</a:t>
+            </a:r>
+            <a:endParaRPr lang="en-US" sz="1800" spc="-60" dirty="0">
+              <a:solidFill>
+                <a:srgbClr val="383838"/>
+              </a:solidFill>
+              <a:latin typeface="Avenir Medium" panose="02000503020000020003" pitchFamily="2" charset="0"/>
+              <a:cs typeface="Courier New" panose="02070309020205020404" pitchFamily="49" charset="0"/>
+            </a:endParaRPr>
+          </a:p>
+          <a:p>
+            <a:pPr marL="755649" marR="5079" lvl="1" indent="-285750">
+              <a:lnSpc>
+                <a:spcPct val="100000"/>
+              </a:lnSpc>
+              <a:spcBef>
+                <a:spcPts val="0"/>
+              </a:spcBef>
+              <a:spcAft>
+                <a:spcPts val="1200"/>
+              </a:spcAft>
+              <a:buFont typeface="Arial" panose="020B0604020202020204" pitchFamily="34" charset="0"/>
+              <a:buChar char="•"/>
+            </a:pPr>
+            <a:r>
+              <a:rPr lang="en-US" sz="1800" spc="-60" dirty="0">
+                <a:solidFill>
+                  <a:srgbClr val="383838"/>
+                </a:solidFill>
+                <a:latin typeface="Avenir Medium" panose="02000503020000020003" pitchFamily="2" charset="0"/>
+                <a:cs typeface="Courier New" panose="02070309020205020404" pitchFamily="49" charset="0"/>
+              </a:rPr>
+              <a:t>The following commands must be executed from the Graphite/Grafana server</a:t>
+            </a:r>
+          </a:p>
+          <a:p>
+            <a:pPr marL="298449" marR="5079" indent="-285750">
+              <a:lnSpc>
+                <a:spcPct val="100000"/>
+              </a:lnSpc>
+              <a:spcBef>
+                <a:spcPts val="0"/>
+              </a:spcBef>
+              <a:spcAft>
+                <a:spcPts val="1200"/>
+              </a:spcAft>
+              <a:buFont typeface="Arial" panose="020B0604020202020204" pitchFamily="34" charset="0"/>
+              <a:buChar char="•"/>
+            </a:pPr>
+            <a:r>
+              <a:rPr lang="en-US" sz="1800" spc="-60" dirty="0">
+                <a:solidFill>
+                  <a:srgbClr val="383838"/>
+                </a:solidFill>
+                <a:latin typeface="Avenir Medium" panose="02000503020000020003" pitchFamily="2" charset="0"/>
+                <a:cs typeface="Courier New" panose="02070309020205020404" pitchFamily="49" charset="0"/>
+              </a:rPr>
+              <a:t>Create a File System</a:t>
+            </a:r>
+          </a:p>
+          <a:p>
+            <a:pPr marL="755649" marR="5079" lvl="1" indent="-285750">
+              <a:lnSpc>
+                <a:spcPct val="100000"/>
+              </a:lnSpc>
+              <a:spcBef>
+                <a:spcPts val="0"/>
+              </a:spcBef>
+              <a:spcAft>
+                <a:spcPts val="1200"/>
+              </a:spcAft>
+              <a:buFont typeface="Arial" panose="020B0604020202020204" pitchFamily="34" charset="0"/>
+              <a:buChar char="•"/>
+            </a:pPr>
+            <a:r>
+              <a:rPr lang="en-US" sz="1400" spc="-60" dirty="0" err="1">
+                <a:solidFill>
+                  <a:srgbClr val="383838"/>
+                </a:solidFill>
+                <a:latin typeface="Courier New" panose="02070309020205020404" pitchFamily="49" charset="0"/>
+                <a:cs typeface="Courier New" panose="02070309020205020404" pitchFamily="49" charset="0"/>
+              </a:rPr>
+              <a:t>sudo</a:t>
+            </a:r>
+            <a:r>
+              <a:rPr lang="en-US" sz="1400" spc="-60" dirty="0">
+                <a:solidFill>
+                  <a:srgbClr val="383838"/>
+                </a:solidFill>
+                <a:latin typeface="Courier New" panose="02070309020205020404" pitchFamily="49" charset="0"/>
+                <a:cs typeface="Courier New" panose="02070309020205020404" pitchFamily="49" charset="0"/>
+              </a:rPr>
+              <a:t> mkfs.ext4 /dev/disk/by-id/scsi-0Linode_Volume_data</a:t>
+            </a:r>
+          </a:p>
+          <a:p>
+            <a:pPr marL="298449" marR="5079" indent="-285750">
+              <a:lnSpc>
+                <a:spcPct val="100000"/>
+              </a:lnSpc>
+              <a:spcBef>
+                <a:spcPts val="0"/>
+              </a:spcBef>
+              <a:spcAft>
+                <a:spcPts val="1200"/>
+              </a:spcAft>
+              <a:buFont typeface="Arial" panose="020B0604020202020204" pitchFamily="34" charset="0"/>
+              <a:buChar char="•"/>
+            </a:pPr>
+            <a:r>
+              <a:rPr lang="en-US" sz="1800" b="1" spc="-60" dirty="0">
+                <a:solidFill>
+                  <a:srgbClr val="383838"/>
+                </a:solidFill>
+                <a:latin typeface="Avenir Book" panose="02000503020000020003" pitchFamily="2" charset="0"/>
+                <a:cs typeface="Courier New" panose="02070309020205020404" pitchFamily="49" charset="0"/>
+              </a:rPr>
+              <a:t>Create a Mount Point</a:t>
+            </a:r>
+          </a:p>
+          <a:p>
+            <a:pPr marL="755649" marR="5079" lvl="1" indent="-285750">
+              <a:lnSpc>
+                <a:spcPct val="100000"/>
+              </a:lnSpc>
+              <a:spcBef>
+                <a:spcPts val="0"/>
+              </a:spcBef>
+              <a:spcAft>
+                <a:spcPts val="1200"/>
+              </a:spcAft>
+              <a:buFont typeface="Arial" panose="020B0604020202020204" pitchFamily="34" charset="0"/>
+              <a:buChar char="•"/>
+            </a:pPr>
+            <a:r>
+              <a:rPr lang="en-US" sz="1400" spc="-60" dirty="0" err="1">
+                <a:solidFill>
+                  <a:srgbClr val="383838"/>
+                </a:solidFill>
+                <a:latin typeface="Courier New" panose="02070309020205020404" pitchFamily="49" charset="0"/>
+                <a:cs typeface="Courier New" panose="02070309020205020404" pitchFamily="49" charset="0"/>
+              </a:rPr>
+              <a:t>sudo</a:t>
+            </a:r>
+            <a:r>
+              <a:rPr lang="en-US" sz="1400" spc="-60" dirty="0">
+                <a:solidFill>
+                  <a:srgbClr val="383838"/>
+                </a:solidFill>
+                <a:latin typeface="Courier New" panose="02070309020205020404" pitchFamily="49" charset="0"/>
+                <a:cs typeface="Courier New" panose="02070309020205020404" pitchFamily="49" charset="0"/>
+              </a:rPr>
+              <a:t> </a:t>
+            </a:r>
+            <a:r>
+              <a:rPr lang="en-US" sz="1400" spc="-60" dirty="0" err="1">
+                <a:solidFill>
+                  <a:srgbClr val="383838"/>
+                </a:solidFill>
+                <a:latin typeface="Courier New" panose="02070309020205020404" pitchFamily="49" charset="0"/>
+                <a:cs typeface="Courier New" panose="02070309020205020404" pitchFamily="49" charset="0"/>
+              </a:rPr>
+              <a:t>mkdir</a:t>
+            </a:r>
+            <a:r>
+              <a:rPr lang="en-US" sz="1400" spc="-60" dirty="0">
+                <a:solidFill>
+                  <a:srgbClr val="383838"/>
+                </a:solidFill>
+                <a:latin typeface="Courier New" panose="02070309020205020404" pitchFamily="49" charset="0"/>
+                <a:cs typeface="Courier New" panose="02070309020205020404" pitchFamily="49" charset="0"/>
+              </a:rPr>
+              <a:t> –p /</a:t>
+            </a:r>
+            <a:r>
+              <a:rPr lang="en-US" sz="1400" spc="-60" dirty="0" err="1">
+                <a:solidFill>
+                  <a:srgbClr val="383838"/>
+                </a:solidFill>
+                <a:latin typeface="Courier New" panose="02070309020205020404" pitchFamily="49" charset="0"/>
+                <a:cs typeface="Courier New" panose="02070309020205020404" pitchFamily="49" charset="0"/>
+              </a:rPr>
+              <a:t>mnt</a:t>
+            </a:r>
+            <a:r>
+              <a:rPr lang="en-US" sz="1400" spc="-60" dirty="0">
+                <a:solidFill>
+                  <a:srgbClr val="383838"/>
+                </a:solidFill>
+                <a:latin typeface="Courier New" panose="02070309020205020404" pitchFamily="49" charset="0"/>
+                <a:cs typeface="Courier New" panose="02070309020205020404" pitchFamily="49" charset="0"/>
+              </a:rPr>
+              <a:t>/data</a:t>
+            </a:r>
+          </a:p>
+        </p:txBody>
+      </p:sp>
+    </p:spTree>
+    <p:extLst>
+      <p:ext uri="{BB962C8B-B14F-4D97-AF65-F5344CB8AC3E}">
+        <p14:creationId xmlns:p14="http://schemas.microsoft.com/office/powerpoint/2010/main" val="479371121"/>
+      </p:ext>
+    </p:extLst>
+  </p:cSld>
+  <p:clrMapOvr>
+    <a:masterClrMapping/>
+  </p:clrMapOvr>
+</p:sld>
+</file>
+
+<file path=ppt/slides/slide23.xml><?xml version="1.0" encoding="utf-8"?>
+<p:sld xmlns:a="http://schemas.openxmlformats.org/drawingml/2006/main" xmlns:r="http://schemas.openxmlformats.org/officeDocument/2006/relationships" xmlns:p="http://schemas.openxmlformats.org/presentationml/2006/main">
+  <p:cSld>
+    <p:spTree>
+      <p:nvGrpSpPr>
+        <p:cNvPr id="1" name="Shape 196"/>
+        <p:cNvGrpSpPr/>
+        <p:nvPr/>
+      </p:nvGrpSpPr>
+      <p:grpSpPr>
+        <a:xfrm>
+          <a:off x="0" y="0"/>
+          <a:ext cx="0" cy="0"/>
+          <a:chOff x="0" y="0"/>
+          <a:chExt cx="0" cy="0"/>
+        </a:xfrm>
+      </p:grpSpPr>
+      <p:sp>
+        <p:nvSpPr>
+          <p:cNvPr id="197" name="Google Shape;197;p10"/>
+          <p:cNvSpPr txBox="1">
+            <a:spLocks noGrp="1"/>
+          </p:cNvSpPr>
+          <p:nvPr>
+            <p:ph type="title"/>
+          </p:nvPr>
+        </p:nvSpPr>
+        <p:spPr>
+          <a:xfrm>
+            <a:off x="540000" y="540001"/>
+            <a:ext cx="9230301" cy="588712"/>
+          </a:xfrm>
+          <a:prstGeom prst="rect">
+            <a:avLst/>
+          </a:prstGeom>
+          <a:noFill/>
+          <a:ln>
+            <a:noFill/>
+          </a:ln>
+        </p:spPr>
+        <p:txBody>
+          <a:bodyPr spcFirstLastPara="1" wrap="square" lIns="0" tIns="0" rIns="0" bIns="0" anchor="t" anchorCtr="0">
+            <a:noAutofit/>
+          </a:bodyPr>
+          <a:lstStyle/>
+          <a:p>
+            <a:pPr marL="0" lvl="0" indent="0" algn="l" rtl="0">
+              <a:lnSpc>
+                <a:spcPct val="90000"/>
+              </a:lnSpc>
+              <a:spcBef>
+                <a:spcPts val="0"/>
+              </a:spcBef>
+              <a:spcAft>
+                <a:spcPts val="0"/>
+              </a:spcAft>
+              <a:buClr>
+                <a:srgbClr val="0099CC"/>
+              </a:buClr>
+              <a:buSzPts val="3600"/>
+              <a:buFont typeface="Arial"/>
+              <a:buNone/>
+            </a:pPr>
+            <a:r>
+              <a:rPr lang="en-US" b="0" dirty="0">
+                <a:latin typeface="Avenir Medium" panose="02000503020000020003" pitchFamily="2" charset="0"/>
+              </a:rPr>
+              <a:t>Implementing an External Storage Volume</a:t>
+            </a:r>
+            <a:endParaRPr b="0" dirty="0">
+              <a:latin typeface="Avenir Medium" panose="02000503020000020003" pitchFamily="2" charset="0"/>
+            </a:endParaRPr>
+          </a:p>
+        </p:txBody>
+      </p:sp>
+      <p:sp>
+        <p:nvSpPr>
+          <p:cNvPr id="14" name="Google Shape;198;p10">
+            <a:extLst>
+              <a:ext uri="{FF2B5EF4-FFF2-40B4-BE49-F238E27FC236}">
+                <a16:creationId xmlns:a16="http://schemas.microsoft.com/office/drawing/2014/main" id="{ADF47C86-3730-8F43-AF64-4FD21181E7A8}"/>
+              </a:ext>
+            </a:extLst>
+          </p:cNvPr>
+          <p:cNvSpPr txBox="1">
+            <a:spLocks noGrp="1"/>
+          </p:cNvSpPr>
+          <p:nvPr>
+            <p:ph type="body" idx="1"/>
+          </p:nvPr>
+        </p:nvSpPr>
+        <p:spPr>
+          <a:xfrm>
+            <a:off x="540000" y="1128713"/>
+            <a:ext cx="11310624" cy="5345239"/>
+          </a:xfrm>
+          <a:prstGeom prst="rect">
+            <a:avLst/>
+          </a:prstGeom>
+          <a:noFill/>
+          <a:ln>
+            <a:noFill/>
+          </a:ln>
+        </p:spPr>
+        <p:txBody>
+          <a:bodyPr spcFirstLastPara="1" wrap="square" lIns="0" tIns="0" rIns="0" bIns="0" anchor="t" anchorCtr="0">
+            <a:noAutofit/>
+          </a:bodyPr>
+          <a:lstStyle/>
+          <a:p>
+            <a:pPr marL="298449" marR="5079" indent="-285750">
+              <a:lnSpc>
+                <a:spcPct val="100000"/>
+              </a:lnSpc>
+              <a:spcBef>
+                <a:spcPts val="0"/>
+              </a:spcBef>
+              <a:spcAft>
+                <a:spcPts val="1200"/>
+              </a:spcAft>
+              <a:buFont typeface="Arial" panose="020B0604020202020204" pitchFamily="34" charset="0"/>
+              <a:buChar char="•"/>
+            </a:pPr>
+            <a:r>
+              <a:rPr lang="en-US" sz="1800" b="1" spc="-60" dirty="0">
+                <a:solidFill>
+                  <a:srgbClr val="383838"/>
+                </a:solidFill>
+                <a:latin typeface="Avenir Book" panose="02000503020000020003" pitchFamily="2" charset="0"/>
+                <a:cs typeface="Courier New" panose="02070309020205020404" pitchFamily="49" charset="0"/>
+              </a:rPr>
+              <a:t>Mount the Volume</a:t>
+            </a:r>
+          </a:p>
+          <a:p>
+            <a:pPr marL="755649" marR="5079" lvl="1" indent="-285750">
+              <a:lnSpc>
+                <a:spcPct val="100000"/>
+              </a:lnSpc>
+              <a:spcBef>
+                <a:spcPts val="0"/>
+              </a:spcBef>
+              <a:spcAft>
+                <a:spcPts val="1200"/>
+              </a:spcAft>
+              <a:buFont typeface="Arial" panose="020B0604020202020204" pitchFamily="34" charset="0"/>
+              <a:buChar char="•"/>
+            </a:pPr>
+            <a:r>
+              <a:rPr lang="en-US" sz="1400" spc="-60" dirty="0" err="1">
+                <a:solidFill>
+                  <a:srgbClr val="383838"/>
+                </a:solidFill>
+                <a:latin typeface="Courier New" panose="02070309020205020404" pitchFamily="49" charset="0"/>
+                <a:cs typeface="Courier New" panose="02070309020205020404" pitchFamily="49" charset="0"/>
+              </a:rPr>
+              <a:t>sudo</a:t>
+            </a:r>
+            <a:r>
+              <a:rPr lang="en-US" sz="1400" spc="-60" dirty="0">
+                <a:solidFill>
+                  <a:srgbClr val="383838"/>
+                </a:solidFill>
+                <a:latin typeface="Courier New" panose="02070309020205020404" pitchFamily="49" charset="0"/>
+                <a:cs typeface="Courier New" panose="02070309020205020404" pitchFamily="49" charset="0"/>
+              </a:rPr>
+              <a:t> mount /dev/disk/by-id/scsi-0Linode_Volume_data /</a:t>
+            </a:r>
+            <a:r>
+              <a:rPr lang="en-US" sz="1400" spc="-60" dirty="0" err="1">
+                <a:solidFill>
+                  <a:srgbClr val="383838"/>
+                </a:solidFill>
+                <a:latin typeface="Courier New" panose="02070309020205020404" pitchFamily="49" charset="0"/>
+                <a:cs typeface="Courier New" panose="02070309020205020404" pitchFamily="49" charset="0"/>
+              </a:rPr>
+              <a:t>mnt</a:t>
+            </a:r>
+            <a:r>
+              <a:rPr lang="en-US" sz="1400" spc="-60" dirty="0">
+                <a:solidFill>
+                  <a:srgbClr val="383838"/>
+                </a:solidFill>
+                <a:latin typeface="Courier New" panose="02070309020205020404" pitchFamily="49" charset="0"/>
+                <a:cs typeface="Courier New" panose="02070309020205020404" pitchFamily="49" charset="0"/>
+              </a:rPr>
+              <a:t>/data</a:t>
+            </a:r>
+          </a:p>
+          <a:p>
+            <a:pPr marL="298449" marR="5079" indent="-285750">
+              <a:lnSpc>
+                <a:spcPct val="100000"/>
+              </a:lnSpc>
+              <a:spcBef>
+                <a:spcPts val="0"/>
+              </a:spcBef>
+              <a:spcAft>
+                <a:spcPts val="1200"/>
+              </a:spcAft>
+              <a:buFont typeface="Arial" panose="020B0604020202020204" pitchFamily="34" charset="0"/>
+              <a:buChar char="•"/>
+            </a:pPr>
+            <a:r>
+              <a:rPr lang="en-US" sz="1800" spc="-60" dirty="0">
+                <a:solidFill>
+                  <a:srgbClr val="383838"/>
+                </a:solidFill>
+                <a:latin typeface="Avenir Medium" panose="02000503020000020003" pitchFamily="2" charset="0"/>
+                <a:cs typeface="Courier New" panose="02070309020205020404" pitchFamily="49" charset="0"/>
+              </a:rPr>
+              <a:t>Add the following line to </a:t>
+            </a:r>
+            <a:r>
+              <a:rPr lang="en-US" sz="1800" spc="-60" dirty="0">
+                <a:solidFill>
+                  <a:srgbClr val="383838"/>
+                </a:solidFill>
+                <a:latin typeface="Courier New" panose="02070309020205020404" pitchFamily="49" charset="0"/>
+                <a:cs typeface="Courier New" panose="02070309020205020404" pitchFamily="49" charset="0"/>
+              </a:rPr>
+              <a:t>/</a:t>
+            </a:r>
+            <a:r>
+              <a:rPr lang="en-US" sz="1800" spc="-60" dirty="0" err="1">
+                <a:solidFill>
+                  <a:srgbClr val="383838"/>
+                </a:solidFill>
+                <a:latin typeface="Courier New" panose="02070309020205020404" pitchFamily="49" charset="0"/>
+                <a:cs typeface="Courier New" panose="02070309020205020404" pitchFamily="49" charset="0"/>
+              </a:rPr>
+              <a:t>etc</a:t>
+            </a:r>
+            <a:r>
+              <a:rPr lang="en-US" sz="1800" spc="-60" dirty="0">
+                <a:solidFill>
+                  <a:srgbClr val="383838"/>
+                </a:solidFill>
+                <a:latin typeface="Courier New" panose="02070309020205020404" pitchFamily="49" charset="0"/>
+                <a:cs typeface="Courier New" panose="02070309020205020404" pitchFamily="49" charset="0"/>
+              </a:rPr>
+              <a:t>/</a:t>
+            </a:r>
+            <a:r>
+              <a:rPr lang="en-US" sz="1800" spc="-60" dirty="0" err="1">
+                <a:solidFill>
+                  <a:srgbClr val="383838"/>
+                </a:solidFill>
+                <a:latin typeface="Courier New" panose="02070309020205020404" pitchFamily="49" charset="0"/>
+                <a:cs typeface="Courier New" panose="02070309020205020404" pitchFamily="49" charset="0"/>
+              </a:rPr>
+              <a:t>fstab</a:t>
+            </a:r>
+            <a:r>
+              <a:rPr lang="en-US" sz="1800" spc="-60" dirty="0">
+                <a:solidFill>
+                  <a:srgbClr val="383838"/>
+                </a:solidFill>
+                <a:latin typeface="Courier New" panose="02070309020205020404" pitchFamily="49" charset="0"/>
+                <a:cs typeface="Courier New" panose="02070309020205020404" pitchFamily="49" charset="0"/>
+              </a:rPr>
+              <a:t> </a:t>
+            </a:r>
+            <a:r>
+              <a:rPr lang="en-US" sz="1800" spc="-60" dirty="0">
+                <a:solidFill>
+                  <a:srgbClr val="383838"/>
+                </a:solidFill>
+                <a:latin typeface="Avenir Medium" panose="02000503020000020003" pitchFamily="2" charset="0"/>
+                <a:cs typeface="Courier New" panose="02070309020205020404" pitchFamily="49" charset="0"/>
+              </a:rPr>
+              <a:t>to mount the volume when the Linode server starts</a:t>
+            </a:r>
+          </a:p>
+          <a:p>
+            <a:pPr marL="755649" marR="5079" lvl="1" indent="-285750">
+              <a:lnSpc>
+                <a:spcPct val="100000"/>
+              </a:lnSpc>
+              <a:spcBef>
+                <a:spcPts val="0"/>
+              </a:spcBef>
+              <a:spcAft>
+                <a:spcPts val="1200"/>
+              </a:spcAft>
+              <a:buFont typeface="Arial" panose="020B0604020202020204" pitchFamily="34" charset="0"/>
+              <a:buChar char="•"/>
+            </a:pPr>
+            <a:r>
+              <a:rPr lang="en-US" sz="1400" spc="-60" dirty="0">
+                <a:solidFill>
+                  <a:srgbClr val="383838"/>
+                </a:solidFill>
+                <a:latin typeface="Courier New" panose="02070309020205020404" pitchFamily="49" charset="0"/>
+                <a:cs typeface="Courier New" panose="02070309020205020404" pitchFamily="49" charset="0"/>
+              </a:rPr>
+              <a:t>/dev/disk/by-id/scsi-0Linode_Volume_data /</a:t>
+            </a:r>
+            <a:r>
+              <a:rPr lang="en-US" sz="1400" spc="-60" dirty="0" err="1">
+                <a:solidFill>
+                  <a:srgbClr val="383838"/>
+                </a:solidFill>
+                <a:latin typeface="Courier New" panose="02070309020205020404" pitchFamily="49" charset="0"/>
+                <a:cs typeface="Courier New" panose="02070309020205020404" pitchFamily="49" charset="0"/>
+              </a:rPr>
+              <a:t>mnt</a:t>
+            </a:r>
+            <a:r>
+              <a:rPr lang="en-US" sz="1400" spc="-60" dirty="0">
+                <a:solidFill>
+                  <a:srgbClr val="383838"/>
+                </a:solidFill>
+                <a:latin typeface="Courier New" panose="02070309020205020404" pitchFamily="49" charset="0"/>
+                <a:cs typeface="Courier New" panose="02070309020205020404" pitchFamily="49" charset="0"/>
+              </a:rPr>
+              <a:t>/data ext4 </a:t>
+            </a:r>
+            <a:r>
+              <a:rPr lang="en-US" sz="1400" spc="-60" dirty="0" err="1">
+                <a:solidFill>
+                  <a:srgbClr val="383838"/>
+                </a:solidFill>
+                <a:latin typeface="Courier New" panose="02070309020205020404" pitchFamily="49" charset="0"/>
+                <a:cs typeface="Courier New" panose="02070309020205020404" pitchFamily="49" charset="0"/>
+              </a:rPr>
+              <a:t>defaults,noatime,nofail</a:t>
+            </a:r>
+            <a:r>
+              <a:rPr lang="en-US" sz="1400" spc="-60" dirty="0">
+                <a:solidFill>
+                  <a:srgbClr val="383838"/>
+                </a:solidFill>
+                <a:latin typeface="Courier New" panose="02070309020205020404" pitchFamily="49" charset="0"/>
+                <a:cs typeface="Courier New" panose="02070309020205020404" pitchFamily="49" charset="0"/>
+              </a:rPr>
+              <a:t> 0 2</a:t>
+            </a:r>
+          </a:p>
+          <a:p>
+            <a:pPr marL="298449" marR="5079" indent="-285750">
+              <a:lnSpc>
+                <a:spcPct val="100000"/>
+              </a:lnSpc>
+              <a:spcBef>
+                <a:spcPts val="0"/>
+              </a:spcBef>
+              <a:spcAft>
+                <a:spcPts val="1200"/>
+              </a:spcAft>
+              <a:buFont typeface="Arial" panose="020B0604020202020204" pitchFamily="34" charset="0"/>
+              <a:buChar char="•"/>
+            </a:pPr>
+            <a:r>
+              <a:rPr lang="en-US" sz="1800" b="1" spc="-60" dirty="0">
+                <a:solidFill>
+                  <a:srgbClr val="383838"/>
+                </a:solidFill>
+                <a:latin typeface="Avenir Book" panose="02000503020000020003" pitchFamily="2" charset="0"/>
+                <a:cs typeface="Courier New" panose="02070309020205020404" pitchFamily="49" charset="0"/>
+              </a:rPr>
+              <a:t>The following steps should be performed on the Graphite/Grafana server when no tests are running</a:t>
+            </a:r>
+          </a:p>
+          <a:p>
+            <a:pPr marL="298449" marR="5079" indent="-285750">
+              <a:lnSpc>
+                <a:spcPct val="100000"/>
+              </a:lnSpc>
+              <a:spcBef>
+                <a:spcPts val="0"/>
+              </a:spcBef>
+              <a:spcAft>
+                <a:spcPts val="1200"/>
+              </a:spcAft>
+              <a:buFont typeface="Arial" panose="020B0604020202020204" pitchFamily="34" charset="0"/>
+              <a:buChar char="•"/>
+            </a:pPr>
+            <a:r>
+              <a:rPr lang="en-US" sz="1800" b="1" spc="-60" dirty="0">
+                <a:solidFill>
+                  <a:srgbClr val="383838"/>
+                </a:solidFill>
+                <a:latin typeface="Avenir Book" panose="02000503020000020003" pitchFamily="2" charset="0"/>
+                <a:cs typeface="Courier New" panose="02070309020205020404" pitchFamily="49" charset="0"/>
+              </a:rPr>
+              <a:t>Shutdown the Graphite database</a:t>
+            </a:r>
+          </a:p>
+          <a:p>
+            <a:pPr marL="755649" marR="5079" lvl="1" indent="-285750">
+              <a:lnSpc>
+                <a:spcPct val="100000"/>
+              </a:lnSpc>
+              <a:spcBef>
+                <a:spcPts val="0"/>
+              </a:spcBef>
+              <a:spcAft>
+                <a:spcPts val="1200"/>
+              </a:spcAft>
+              <a:buFont typeface="Arial" panose="020B0604020202020204" pitchFamily="34" charset="0"/>
+              <a:buChar char="•"/>
+            </a:pPr>
+            <a:r>
+              <a:rPr lang="en-US" sz="1400" spc="-60" dirty="0" err="1">
+                <a:solidFill>
+                  <a:srgbClr val="383838"/>
+                </a:solidFill>
+                <a:latin typeface="Courier New" panose="02070309020205020404" pitchFamily="49" charset="0"/>
+                <a:cs typeface="Courier New" panose="02070309020205020404" pitchFamily="49" charset="0"/>
+              </a:rPr>
+              <a:t>sudo</a:t>
+            </a:r>
+            <a:r>
+              <a:rPr lang="en-US" sz="1400" spc="-60" dirty="0">
+                <a:solidFill>
+                  <a:srgbClr val="383838"/>
+                </a:solidFill>
+                <a:latin typeface="Courier New" panose="02070309020205020404" pitchFamily="49" charset="0"/>
+                <a:cs typeface="Courier New" panose="02070309020205020404" pitchFamily="49" charset="0"/>
+              </a:rPr>
+              <a:t> /</a:t>
+            </a:r>
+            <a:r>
+              <a:rPr lang="en-US" sz="1400" spc="-60" dirty="0" err="1">
+                <a:solidFill>
+                  <a:srgbClr val="383838"/>
+                </a:solidFill>
+                <a:latin typeface="Courier New" panose="02070309020205020404" pitchFamily="49" charset="0"/>
+                <a:cs typeface="Courier New" panose="02070309020205020404" pitchFamily="49" charset="0"/>
+              </a:rPr>
+              <a:t>usr</a:t>
+            </a:r>
+            <a:r>
+              <a:rPr lang="en-US" sz="1400" spc="-60" dirty="0">
+                <a:solidFill>
+                  <a:srgbClr val="383838"/>
+                </a:solidFill>
+                <a:latin typeface="Courier New" panose="02070309020205020404" pitchFamily="49" charset="0"/>
+                <a:cs typeface="Courier New" panose="02070309020205020404" pitchFamily="49" charset="0"/>
+              </a:rPr>
+              <a:t>/local/graphite/</a:t>
+            </a:r>
+            <a:r>
+              <a:rPr lang="en-US" sz="1400" spc="-60" dirty="0" err="1">
+                <a:solidFill>
+                  <a:srgbClr val="383838"/>
+                </a:solidFill>
+                <a:latin typeface="Courier New" panose="02070309020205020404" pitchFamily="49" charset="0"/>
+                <a:cs typeface="Courier New" panose="02070309020205020404" pitchFamily="49" charset="0"/>
+              </a:rPr>
+              <a:t>graphite.sh</a:t>
+            </a:r>
+            <a:r>
+              <a:rPr lang="en-US" sz="1400" spc="-60" dirty="0">
+                <a:solidFill>
+                  <a:srgbClr val="383838"/>
+                </a:solidFill>
+                <a:latin typeface="Courier New" panose="02070309020205020404" pitchFamily="49" charset="0"/>
+                <a:cs typeface="Courier New" panose="02070309020205020404" pitchFamily="49" charset="0"/>
+              </a:rPr>
+              <a:t> stop</a:t>
+            </a:r>
+          </a:p>
+          <a:p>
+            <a:pPr marL="298449" marR="5079" indent="-285750">
+              <a:lnSpc>
+                <a:spcPct val="100000"/>
+              </a:lnSpc>
+              <a:spcBef>
+                <a:spcPts val="0"/>
+              </a:spcBef>
+              <a:spcAft>
+                <a:spcPts val="1200"/>
+              </a:spcAft>
+              <a:buFont typeface="Arial" panose="020B0604020202020204" pitchFamily="34" charset="0"/>
+              <a:buChar char="•"/>
+            </a:pPr>
+            <a:r>
+              <a:rPr lang="en-US" sz="1800" b="1" spc="-60" dirty="0">
+                <a:solidFill>
+                  <a:srgbClr val="383838"/>
+                </a:solidFill>
+                <a:latin typeface="Avenir Book" panose="02000503020000020003" pitchFamily="2" charset="0"/>
+                <a:cs typeface="Courier New" panose="02070309020205020404" pitchFamily="49" charset="0"/>
+              </a:rPr>
+              <a:t>Move the Graphite database to the new volume</a:t>
+            </a:r>
+          </a:p>
+          <a:p>
+            <a:pPr marL="755649" marR="5079" lvl="1" indent="-285750">
+              <a:lnSpc>
+                <a:spcPct val="100000"/>
+              </a:lnSpc>
+              <a:spcBef>
+                <a:spcPts val="0"/>
+              </a:spcBef>
+              <a:spcAft>
+                <a:spcPts val="1200"/>
+              </a:spcAft>
+              <a:buFont typeface="Arial" panose="020B0604020202020204" pitchFamily="34" charset="0"/>
+              <a:buChar char="•"/>
+            </a:pPr>
+            <a:r>
+              <a:rPr lang="en-US" sz="1400" spc="-60" dirty="0" err="1">
+                <a:solidFill>
+                  <a:srgbClr val="383838"/>
+                </a:solidFill>
+                <a:latin typeface="Courier New" panose="02070309020205020404" pitchFamily="49" charset="0"/>
+                <a:cs typeface="Courier New" panose="02070309020205020404" pitchFamily="49" charset="0"/>
+              </a:rPr>
+              <a:t>sudo</a:t>
+            </a:r>
+            <a:r>
+              <a:rPr lang="en-US" sz="1400" spc="-60" dirty="0">
+                <a:solidFill>
+                  <a:srgbClr val="383838"/>
+                </a:solidFill>
+                <a:latin typeface="Courier New" panose="02070309020205020404" pitchFamily="49" charset="0"/>
+                <a:cs typeface="Courier New" panose="02070309020205020404" pitchFamily="49" charset="0"/>
+              </a:rPr>
+              <a:t> mv /</a:t>
+            </a:r>
+            <a:r>
+              <a:rPr lang="en-US" sz="1400" spc="-60" dirty="0" err="1">
+                <a:solidFill>
+                  <a:srgbClr val="383838"/>
+                </a:solidFill>
+                <a:latin typeface="Courier New" panose="02070309020205020404" pitchFamily="49" charset="0"/>
+                <a:cs typeface="Courier New" panose="02070309020205020404" pitchFamily="49" charset="0"/>
+              </a:rPr>
+              <a:t>usr</a:t>
+            </a:r>
+            <a:r>
+              <a:rPr lang="en-US" sz="1400" spc="-60" dirty="0">
+                <a:solidFill>
+                  <a:srgbClr val="383838"/>
+                </a:solidFill>
+                <a:latin typeface="Courier New" panose="02070309020205020404" pitchFamily="49" charset="0"/>
+                <a:cs typeface="Courier New" panose="02070309020205020404" pitchFamily="49" charset="0"/>
+              </a:rPr>
+              <a:t>/local/graphite/graphite-conf /</a:t>
+            </a:r>
+            <a:r>
+              <a:rPr lang="en-US" sz="1400" spc="-60" dirty="0" err="1">
+                <a:solidFill>
+                  <a:srgbClr val="383838"/>
+                </a:solidFill>
+                <a:latin typeface="Courier New" panose="02070309020205020404" pitchFamily="49" charset="0"/>
+                <a:cs typeface="Courier New" panose="02070309020205020404" pitchFamily="49" charset="0"/>
+              </a:rPr>
+              <a:t>mnt</a:t>
+            </a:r>
+            <a:r>
+              <a:rPr lang="en-US" sz="1400" spc="-60" dirty="0">
+                <a:solidFill>
+                  <a:srgbClr val="383838"/>
+                </a:solidFill>
+                <a:latin typeface="Courier New" panose="02070309020205020404" pitchFamily="49" charset="0"/>
+                <a:cs typeface="Courier New" panose="02070309020205020404" pitchFamily="49" charset="0"/>
+              </a:rPr>
+              <a:t>/data</a:t>
+            </a:r>
+          </a:p>
+          <a:p>
+            <a:pPr marL="755649" marR="5079" lvl="1" indent="-285750">
+              <a:lnSpc>
+                <a:spcPct val="100000"/>
+              </a:lnSpc>
+              <a:spcBef>
+                <a:spcPts val="0"/>
+              </a:spcBef>
+              <a:spcAft>
+                <a:spcPts val="1200"/>
+              </a:spcAft>
+              <a:buFont typeface="Arial" panose="020B0604020202020204" pitchFamily="34" charset="0"/>
+              <a:buChar char="•"/>
+            </a:pPr>
+            <a:r>
+              <a:rPr lang="en-US" sz="1400" spc="-60" dirty="0" err="1">
+                <a:solidFill>
+                  <a:srgbClr val="383838"/>
+                </a:solidFill>
+                <a:latin typeface="Courier New" panose="02070309020205020404" pitchFamily="49" charset="0"/>
+                <a:cs typeface="Courier New" panose="02070309020205020404" pitchFamily="49" charset="0"/>
+              </a:rPr>
+              <a:t>sudo</a:t>
+            </a:r>
+            <a:r>
+              <a:rPr lang="en-US" sz="1400" spc="-60" dirty="0">
+                <a:solidFill>
+                  <a:srgbClr val="383838"/>
+                </a:solidFill>
+                <a:latin typeface="Courier New" panose="02070309020205020404" pitchFamily="49" charset="0"/>
+                <a:cs typeface="Courier New" panose="02070309020205020404" pitchFamily="49" charset="0"/>
+              </a:rPr>
+              <a:t> mv /</a:t>
+            </a:r>
+            <a:r>
+              <a:rPr lang="en-US" sz="1400" spc="-60" dirty="0" err="1">
+                <a:solidFill>
+                  <a:srgbClr val="383838"/>
+                </a:solidFill>
+                <a:latin typeface="Courier New" panose="02070309020205020404" pitchFamily="49" charset="0"/>
+                <a:cs typeface="Courier New" panose="02070309020205020404" pitchFamily="49" charset="0"/>
+              </a:rPr>
+              <a:t>usr</a:t>
+            </a:r>
+            <a:r>
+              <a:rPr lang="en-US" sz="1400" spc="-60" dirty="0">
+                <a:solidFill>
+                  <a:srgbClr val="383838"/>
+                </a:solidFill>
+                <a:latin typeface="Courier New" panose="02070309020205020404" pitchFamily="49" charset="0"/>
+                <a:cs typeface="Courier New" panose="02070309020205020404" pitchFamily="49" charset="0"/>
+              </a:rPr>
+              <a:t>/local/graphite/graphite-storage /</a:t>
+            </a:r>
+            <a:r>
+              <a:rPr lang="en-US" sz="1400" spc="-60" dirty="0" err="1">
+                <a:solidFill>
+                  <a:srgbClr val="383838"/>
+                </a:solidFill>
+                <a:latin typeface="Courier New" panose="02070309020205020404" pitchFamily="49" charset="0"/>
+                <a:cs typeface="Courier New" panose="02070309020205020404" pitchFamily="49" charset="0"/>
+              </a:rPr>
+              <a:t>mnt</a:t>
+            </a:r>
+            <a:r>
+              <a:rPr lang="en-US" sz="1400" spc="-60" dirty="0">
+                <a:solidFill>
+                  <a:srgbClr val="383838"/>
+                </a:solidFill>
+                <a:latin typeface="Courier New" panose="02070309020205020404" pitchFamily="49" charset="0"/>
+                <a:cs typeface="Courier New" panose="02070309020205020404" pitchFamily="49" charset="0"/>
+              </a:rPr>
+              <a:t>/data</a:t>
+            </a:r>
+          </a:p>
+          <a:p>
+            <a:pPr marL="755649" marR="5079" lvl="1" indent="-285750">
+              <a:lnSpc>
+                <a:spcPct val="100000"/>
+              </a:lnSpc>
+              <a:spcBef>
+                <a:spcPts val="0"/>
+              </a:spcBef>
+              <a:spcAft>
+                <a:spcPts val="1200"/>
+              </a:spcAft>
+              <a:buFont typeface="Arial" panose="020B0604020202020204" pitchFamily="34" charset="0"/>
+              <a:buChar char="•"/>
+            </a:pPr>
+            <a:r>
+              <a:rPr lang="en-US" sz="1400" spc="-60" dirty="0" err="1">
+                <a:solidFill>
+                  <a:srgbClr val="383838"/>
+                </a:solidFill>
+                <a:latin typeface="Courier New" panose="02070309020205020404" pitchFamily="49" charset="0"/>
+                <a:cs typeface="Courier New" panose="02070309020205020404" pitchFamily="49" charset="0"/>
+              </a:rPr>
+              <a:t>sudo</a:t>
+            </a:r>
+            <a:r>
+              <a:rPr lang="en-US" sz="1400" spc="-60" dirty="0">
+                <a:solidFill>
+                  <a:srgbClr val="383838"/>
+                </a:solidFill>
+                <a:latin typeface="Courier New" panose="02070309020205020404" pitchFamily="49" charset="0"/>
+                <a:cs typeface="Courier New" panose="02070309020205020404" pitchFamily="49" charset="0"/>
+              </a:rPr>
+              <a:t> mv /</a:t>
+            </a:r>
+            <a:r>
+              <a:rPr lang="en-US" sz="1400" spc="-60" dirty="0" err="1">
+                <a:solidFill>
+                  <a:srgbClr val="383838"/>
+                </a:solidFill>
+                <a:latin typeface="Courier New" panose="02070309020205020404" pitchFamily="49" charset="0"/>
+                <a:cs typeface="Courier New" panose="02070309020205020404" pitchFamily="49" charset="0"/>
+              </a:rPr>
+              <a:t>usr</a:t>
+            </a:r>
+            <a:r>
+              <a:rPr lang="en-US" sz="1400" spc="-60" dirty="0">
+                <a:solidFill>
+                  <a:srgbClr val="383838"/>
+                </a:solidFill>
+                <a:latin typeface="Courier New" panose="02070309020205020404" pitchFamily="49" charset="0"/>
+                <a:cs typeface="Courier New" panose="02070309020205020404" pitchFamily="49" charset="0"/>
+              </a:rPr>
+              <a:t>/local/graphite/graphite-log /</a:t>
+            </a:r>
+            <a:r>
+              <a:rPr lang="en-US" sz="1400" spc="-60" dirty="0" err="1">
+                <a:solidFill>
+                  <a:srgbClr val="383838"/>
+                </a:solidFill>
+                <a:latin typeface="Courier New" panose="02070309020205020404" pitchFamily="49" charset="0"/>
+                <a:cs typeface="Courier New" panose="02070309020205020404" pitchFamily="49" charset="0"/>
+              </a:rPr>
+              <a:t>mnt</a:t>
+            </a:r>
+            <a:r>
+              <a:rPr lang="en-US" sz="1400" spc="-60" dirty="0">
+                <a:solidFill>
+                  <a:srgbClr val="383838"/>
+                </a:solidFill>
+                <a:latin typeface="Courier New" panose="02070309020205020404" pitchFamily="49" charset="0"/>
+                <a:cs typeface="Courier New" panose="02070309020205020404" pitchFamily="49" charset="0"/>
+              </a:rPr>
+              <a:t>/data</a:t>
+            </a:r>
+            <a:endParaRPr lang="en-US" sz="1800" spc="-60" dirty="0">
+              <a:solidFill>
+                <a:srgbClr val="383838"/>
+              </a:solidFill>
+              <a:latin typeface="Courier New" panose="02070309020205020404" pitchFamily="49" charset="0"/>
+              <a:cs typeface="Courier New" panose="02070309020205020404" pitchFamily="49" charset="0"/>
+            </a:endParaRPr>
+          </a:p>
+          <a:p>
+            <a:pPr marL="755649" marR="5079" lvl="1" indent="-285750">
+              <a:lnSpc>
+                <a:spcPct val="100000"/>
+              </a:lnSpc>
+              <a:spcBef>
+                <a:spcPts val="0"/>
+              </a:spcBef>
+              <a:spcAft>
+                <a:spcPts val="1200"/>
+              </a:spcAft>
+              <a:buFont typeface="Arial" panose="020B0604020202020204" pitchFamily="34" charset="0"/>
+              <a:buChar char="•"/>
+            </a:pPr>
+            <a:endParaRPr lang="en-US" sz="1800" spc="-60" dirty="0">
+              <a:solidFill>
+                <a:srgbClr val="383838"/>
+              </a:solidFill>
+              <a:latin typeface="Courier New" panose="02070309020205020404" pitchFamily="49" charset="0"/>
+              <a:cs typeface="Courier New" panose="02070309020205020404" pitchFamily="49" charset="0"/>
+            </a:endParaRPr>
+          </a:p>
+        </p:txBody>
+      </p:sp>
+    </p:spTree>
+    <p:extLst>
+      <p:ext uri="{BB962C8B-B14F-4D97-AF65-F5344CB8AC3E}">
+        <p14:creationId xmlns:p14="http://schemas.microsoft.com/office/powerpoint/2010/main" val="2384774961"/>
+      </p:ext>
+    </p:extLst>
+  </p:cSld>
+  <p:clrMapOvr>
+    <a:masterClrMapping/>
+  </p:clrMapOvr>
+</p:sld>
+</file>
+
+<file path=ppt/slides/slide24.xml><?xml version="1.0" encoding="utf-8"?>
+<p:sld xmlns:a="http://schemas.openxmlformats.org/drawingml/2006/main" xmlns:r="http://schemas.openxmlformats.org/officeDocument/2006/relationships" xmlns:p="http://schemas.openxmlformats.org/presentationml/2006/main">
+  <p:cSld>
+    <p:spTree>
+      <p:nvGrpSpPr>
+        <p:cNvPr id="1" name="Shape 196"/>
+        <p:cNvGrpSpPr/>
+        <p:nvPr/>
+      </p:nvGrpSpPr>
+      <p:grpSpPr>
+        <a:xfrm>
+          <a:off x="0" y="0"/>
+          <a:ext cx="0" cy="0"/>
+          <a:chOff x="0" y="0"/>
+          <a:chExt cx="0" cy="0"/>
+        </a:xfrm>
+      </p:grpSpPr>
+      <p:sp>
+        <p:nvSpPr>
+          <p:cNvPr id="197" name="Google Shape;197;p10"/>
+          <p:cNvSpPr txBox="1">
+            <a:spLocks noGrp="1"/>
+          </p:cNvSpPr>
+          <p:nvPr>
+            <p:ph type="title"/>
+          </p:nvPr>
+        </p:nvSpPr>
+        <p:spPr>
+          <a:xfrm>
+            <a:off x="540000" y="540001"/>
+            <a:ext cx="9230301" cy="588712"/>
+          </a:xfrm>
+          <a:prstGeom prst="rect">
+            <a:avLst/>
+          </a:prstGeom>
+          <a:noFill/>
+          <a:ln>
+            <a:noFill/>
+          </a:ln>
+        </p:spPr>
+        <p:txBody>
+          <a:bodyPr spcFirstLastPara="1" wrap="square" lIns="0" tIns="0" rIns="0" bIns="0" anchor="t" anchorCtr="0">
+            <a:noAutofit/>
+          </a:bodyPr>
+          <a:lstStyle/>
+          <a:p>
+            <a:pPr marL="0" lvl="0" indent="0" algn="l" rtl="0">
+              <a:lnSpc>
+                <a:spcPct val="90000"/>
+              </a:lnSpc>
+              <a:spcBef>
+                <a:spcPts val="0"/>
+              </a:spcBef>
+              <a:spcAft>
+                <a:spcPts val="0"/>
+              </a:spcAft>
+              <a:buClr>
+                <a:srgbClr val="0099CC"/>
+              </a:buClr>
+              <a:buSzPts val="3600"/>
+              <a:buFont typeface="Arial"/>
+              <a:buNone/>
+            </a:pPr>
+            <a:r>
+              <a:rPr lang="en-US" b="0" dirty="0">
+                <a:latin typeface="Avenir Medium" panose="02000503020000020003" pitchFamily="2" charset="0"/>
+              </a:rPr>
+              <a:t>Implementing an External Storage Volume</a:t>
+            </a:r>
+            <a:endParaRPr b="0" dirty="0">
+              <a:latin typeface="Avenir Medium" panose="02000503020000020003" pitchFamily="2" charset="0"/>
+            </a:endParaRPr>
+          </a:p>
+        </p:txBody>
+      </p:sp>
+      <p:sp>
+        <p:nvSpPr>
+          <p:cNvPr id="14" name="Google Shape;198;p10">
+            <a:extLst>
+              <a:ext uri="{FF2B5EF4-FFF2-40B4-BE49-F238E27FC236}">
+                <a16:creationId xmlns:a16="http://schemas.microsoft.com/office/drawing/2014/main" id="{ADF47C86-3730-8F43-AF64-4FD21181E7A8}"/>
+              </a:ext>
+            </a:extLst>
+          </p:cNvPr>
+          <p:cNvSpPr txBox="1">
+            <a:spLocks noGrp="1"/>
+          </p:cNvSpPr>
+          <p:nvPr>
+            <p:ph type="body" idx="1"/>
+          </p:nvPr>
+        </p:nvSpPr>
+        <p:spPr>
+          <a:xfrm>
+            <a:off x="540000" y="1128713"/>
+            <a:ext cx="11310624" cy="5345239"/>
+          </a:xfrm>
+          <a:prstGeom prst="rect">
+            <a:avLst/>
+          </a:prstGeom>
+          <a:noFill/>
+          <a:ln>
+            <a:noFill/>
+          </a:ln>
+        </p:spPr>
+        <p:txBody>
+          <a:bodyPr spcFirstLastPara="1" wrap="square" lIns="0" tIns="0" rIns="0" bIns="0" anchor="t" anchorCtr="0">
+            <a:noAutofit/>
+          </a:bodyPr>
+          <a:lstStyle/>
+          <a:p>
+            <a:pPr marL="298449" marR="5079" indent="-285750">
+              <a:lnSpc>
+                <a:spcPct val="100000"/>
+              </a:lnSpc>
+              <a:spcBef>
+                <a:spcPts val="0"/>
+              </a:spcBef>
+              <a:spcAft>
+                <a:spcPts val="1200"/>
+              </a:spcAft>
+              <a:buFont typeface="Arial" panose="020B0604020202020204" pitchFamily="34" charset="0"/>
+              <a:buChar char="•"/>
+            </a:pPr>
+            <a:r>
+              <a:rPr lang="en-US" sz="1800" b="1" spc="-60" dirty="0">
+                <a:solidFill>
+                  <a:srgbClr val="383838"/>
+                </a:solidFill>
+                <a:latin typeface="Avenir Book" panose="02000503020000020003" pitchFamily="2" charset="0"/>
+                <a:cs typeface="Courier New" panose="02070309020205020404" pitchFamily="49" charset="0"/>
+              </a:rPr>
+              <a:t>Edit </a:t>
+            </a:r>
+            <a:r>
+              <a:rPr lang="en-US" sz="1800" spc="-60" dirty="0">
+                <a:solidFill>
+                  <a:srgbClr val="383838"/>
+                </a:solidFill>
+                <a:latin typeface="Courier New" panose="02070309020205020404" pitchFamily="49" charset="0"/>
+                <a:cs typeface="Courier New" panose="02070309020205020404" pitchFamily="49" charset="0"/>
+              </a:rPr>
+              <a:t>/</a:t>
+            </a:r>
+            <a:r>
+              <a:rPr lang="en-US" sz="1800" spc="-60" dirty="0" err="1">
+                <a:solidFill>
+                  <a:srgbClr val="383838"/>
+                </a:solidFill>
+                <a:latin typeface="Courier New" panose="02070309020205020404" pitchFamily="49" charset="0"/>
+                <a:cs typeface="Courier New" panose="02070309020205020404" pitchFamily="49" charset="0"/>
+              </a:rPr>
+              <a:t>usr</a:t>
+            </a:r>
+            <a:r>
+              <a:rPr lang="en-US" sz="1800" spc="-60" dirty="0">
+                <a:solidFill>
+                  <a:srgbClr val="383838"/>
+                </a:solidFill>
+                <a:latin typeface="Courier New" panose="02070309020205020404" pitchFamily="49" charset="0"/>
+                <a:cs typeface="Courier New" panose="02070309020205020404" pitchFamily="49" charset="0"/>
+              </a:rPr>
+              <a:t>/local/graphite/</a:t>
+            </a:r>
+            <a:r>
+              <a:rPr lang="en-US" sz="1800" spc="-60" dirty="0" err="1">
+                <a:solidFill>
+                  <a:srgbClr val="383838"/>
+                </a:solidFill>
+                <a:latin typeface="Courier New" panose="02070309020205020404" pitchFamily="49" charset="0"/>
+                <a:cs typeface="Courier New" panose="02070309020205020404" pitchFamily="49" charset="0"/>
+              </a:rPr>
+              <a:t>graphite.sh</a:t>
+            </a:r>
+            <a:r>
+              <a:rPr lang="en-US" sz="1800" spc="-60" dirty="0">
+                <a:solidFill>
+                  <a:srgbClr val="383838"/>
+                </a:solidFill>
+                <a:latin typeface="Courier New" panose="02070309020205020404" pitchFamily="49" charset="0"/>
+                <a:cs typeface="Courier New" panose="02070309020205020404" pitchFamily="49" charset="0"/>
+              </a:rPr>
+              <a:t> </a:t>
+            </a:r>
+            <a:r>
+              <a:rPr lang="en-US" sz="1800" b="1" spc="-60" dirty="0">
+                <a:solidFill>
+                  <a:srgbClr val="383838"/>
+                </a:solidFill>
+                <a:latin typeface="Avenir Book" panose="02000503020000020003" pitchFamily="2" charset="0"/>
+                <a:cs typeface="Courier New" panose="02070309020205020404" pitchFamily="49" charset="0"/>
+              </a:rPr>
+              <a:t>and change the highlighted text to </a:t>
+            </a:r>
+            <a:r>
+              <a:rPr lang="en-US" sz="1800" spc="-60" dirty="0">
+                <a:solidFill>
+                  <a:srgbClr val="383838"/>
+                </a:solidFill>
+                <a:latin typeface="Courier New" panose="02070309020205020404" pitchFamily="49" charset="0"/>
+                <a:cs typeface="Courier New" panose="02070309020205020404" pitchFamily="49" charset="0"/>
+              </a:rPr>
+              <a:t>/</a:t>
+            </a:r>
+            <a:r>
+              <a:rPr lang="en-US" sz="1800" spc="-60" dirty="0" err="1">
+                <a:solidFill>
+                  <a:srgbClr val="383838"/>
+                </a:solidFill>
+                <a:latin typeface="Courier New" panose="02070309020205020404" pitchFamily="49" charset="0"/>
+                <a:cs typeface="Courier New" panose="02070309020205020404" pitchFamily="49" charset="0"/>
+              </a:rPr>
+              <a:t>mnt</a:t>
+            </a:r>
+            <a:r>
+              <a:rPr lang="en-US" sz="1800" spc="-60" dirty="0">
+                <a:solidFill>
+                  <a:srgbClr val="383838"/>
+                </a:solidFill>
+                <a:latin typeface="Courier New" panose="02070309020205020404" pitchFamily="49" charset="0"/>
+                <a:cs typeface="Courier New" panose="02070309020205020404" pitchFamily="49" charset="0"/>
+              </a:rPr>
+              <a:t>/data</a:t>
+            </a:r>
+          </a:p>
+          <a:p>
+            <a:pPr marL="755649" marR="5079" lvl="1" indent="-285750">
+              <a:lnSpc>
+                <a:spcPct val="100000"/>
+              </a:lnSpc>
+              <a:spcBef>
+                <a:spcPts val="0"/>
+              </a:spcBef>
+              <a:spcAft>
+                <a:spcPts val="1200"/>
+              </a:spcAft>
+              <a:buFont typeface="Arial" panose="020B0604020202020204" pitchFamily="34" charset="0"/>
+              <a:buChar char="•"/>
+            </a:pPr>
+            <a:r>
+              <a:rPr lang="en-US" sz="1400" spc="-60" dirty="0">
+                <a:solidFill>
+                  <a:srgbClr val="383838"/>
+                </a:solidFill>
+                <a:latin typeface="Courier New" panose="02070309020205020404" pitchFamily="49" charset="0"/>
+                <a:cs typeface="Courier New" panose="02070309020205020404" pitchFamily="49" charset="0"/>
+              </a:rPr>
+              <a:t> -v </a:t>
+            </a:r>
+            <a:r>
+              <a:rPr lang="en-US" sz="1400" spc="-60" dirty="0">
+                <a:solidFill>
+                  <a:srgbClr val="383838"/>
+                </a:solidFill>
+                <a:highlight>
+                  <a:srgbClr val="FFFF00"/>
+                </a:highlight>
+                <a:latin typeface="Courier New" panose="02070309020205020404" pitchFamily="49" charset="0"/>
+                <a:cs typeface="Courier New" panose="02070309020205020404" pitchFamily="49" charset="0"/>
+              </a:rPr>
+              <a:t>/</a:t>
+            </a:r>
+            <a:r>
+              <a:rPr lang="en-US" sz="1400" spc="-60" dirty="0" err="1">
+                <a:solidFill>
+                  <a:srgbClr val="383838"/>
+                </a:solidFill>
+                <a:highlight>
+                  <a:srgbClr val="FFFF00"/>
+                </a:highlight>
+                <a:latin typeface="Courier New" panose="02070309020205020404" pitchFamily="49" charset="0"/>
+                <a:cs typeface="Courier New" panose="02070309020205020404" pitchFamily="49" charset="0"/>
+              </a:rPr>
+              <a:t>usr</a:t>
+            </a:r>
+            <a:r>
+              <a:rPr lang="en-US" sz="1400" spc="-60" dirty="0">
+                <a:solidFill>
+                  <a:srgbClr val="383838"/>
+                </a:solidFill>
+                <a:highlight>
+                  <a:srgbClr val="FFFF00"/>
+                </a:highlight>
+                <a:latin typeface="Courier New" panose="02070309020205020404" pitchFamily="49" charset="0"/>
+                <a:cs typeface="Courier New" panose="02070309020205020404" pitchFamily="49" charset="0"/>
+              </a:rPr>
+              <a:t>/local/graphite</a:t>
+            </a:r>
+            <a:r>
+              <a:rPr lang="en-US" sz="1400" spc="-60" dirty="0">
+                <a:solidFill>
+                  <a:srgbClr val="383838"/>
+                </a:solidFill>
+                <a:latin typeface="Courier New" panose="02070309020205020404" pitchFamily="49" charset="0"/>
+                <a:cs typeface="Courier New" panose="02070309020205020404" pitchFamily="49" charset="0"/>
+              </a:rPr>
+              <a:t>/graphite-conf:/opt/graphite/conf \</a:t>
+            </a:r>
+          </a:p>
+          <a:p>
+            <a:pPr marL="755649" marR="5079" lvl="1" indent="-285750">
+              <a:lnSpc>
+                <a:spcPct val="100000"/>
+              </a:lnSpc>
+              <a:spcBef>
+                <a:spcPts val="0"/>
+              </a:spcBef>
+              <a:spcAft>
+                <a:spcPts val="1200"/>
+              </a:spcAft>
+              <a:buFont typeface="Arial" panose="020B0604020202020204" pitchFamily="34" charset="0"/>
+              <a:buChar char="•"/>
+            </a:pPr>
+            <a:r>
+              <a:rPr lang="en-US" sz="1400" spc="-60" dirty="0">
+                <a:solidFill>
+                  <a:srgbClr val="383838"/>
+                </a:solidFill>
+                <a:latin typeface="Courier New" panose="02070309020205020404" pitchFamily="49" charset="0"/>
+                <a:cs typeface="Courier New" panose="02070309020205020404" pitchFamily="49" charset="0"/>
+              </a:rPr>
+              <a:t> -v </a:t>
+            </a:r>
+            <a:r>
+              <a:rPr lang="en-US" sz="1400" spc="-60" dirty="0">
+                <a:solidFill>
+                  <a:srgbClr val="383838"/>
+                </a:solidFill>
+                <a:highlight>
+                  <a:srgbClr val="FFFF00"/>
+                </a:highlight>
+                <a:latin typeface="Courier New" panose="02070309020205020404" pitchFamily="49" charset="0"/>
+                <a:cs typeface="Courier New" panose="02070309020205020404" pitchFamily="49" charset="0"/>
+              </a:rPr>
+              <a:t>/</a:t>
+            </a:r>
+            <a:r>
+              <a:rPr lang="en-US" sz="1400" spc="-60" dirty="0" err="1">
+                <a:solidFill>
+                  <a:srgbClr val="383838"/>
+                </a:solidFill>
+                <a:highlight>
+                  <a:srgbClr val="FFFF00"/>
+                </a:highlight>
+                <a:latin typeface="Courier New" panose="02070309020205020404" pitchFamily="49" charset="0"/>
+                <a:cs typeface="Courier New" panose="02070309020205020404" pitchFamily="49" charset="0"/>
+              </a:rPr>
+              <a:t>usr</a:t>
+            </a:r>
+            <a:r>
+              <a:rPr lang="en-US" sz="1400" spc="-60" dirty="0">
+                <a:solidFill>
+                  <a:srgbClr val="383838"/>
+                </a:solidFill>
+                <a:highlight>
+                  <a:srgbClr val="FFFF00"/>
+                </a:highlight>
+                <a:latin typeface="Courier New" panose="02070309020205020404" pitchFamily="49" charset="0"/>
+                <a:cs typeface="Courier New" panose="02070309020205020404" pitchFamily="49" charset="0"/>
+              </a:rPr>
+              <a:t>/local/graphite</a:t>
+            </a:r>
+            <a:r>
+              <a:rPr lang="en-US" sz="1400" spc="-60" dirty="0">
+                <a:solidFill>
+                  <a:srgbClr val="383838"/>
+                </a:solidFill>
+                <a:latin typeface="Courier New" panose="02070309020205020404" pitchFamily="49" charset="0"/>
+                <a:cs typeface="Courier New" panose="02070309020205020404" pitchFamily="49" charset="0"/>
+              </a:rPr>
+              <a:t>/graphite-storage:/opt/graphite/storage \</a:t>
+            </a:r>
+          </a:p>
+          <a:p>
+            <a:pPr marL="755649" marR="5079" lvl="1" indent="-285750">
+              <a:lnSpc>
+                <a:spcPct val="100000"/>
+              </a:lnSpc>
+              <a:spcBef>
+                <a:spcPts val="0"/>
+              </a:spcBef>
+              <a:spcAft>
+                <a:spcPts val="1200"/>
+              </a:spcAft>
+              <a:buFont typeface="Arial" panose="020B0604020202020204" pitchFamily="34" charset="0"/>
+              <a:buChar char="•"/>
+            </a:pPr>
+            <a:r>
+              <a:rPr lang="en-US" sz="1400" spc="-60" dirty="0">
+                <a:solidFill>
+                  <a:srgbClr val="383838"/>
+                </a:solidFill>
+                <a:latin typeface="Courier New" panose="02070309020205020404" pitchFamily="49" charset="0"/>
+                <a:cs typeface="Courier New" panose="02070309020205020404" pitchFamily="49" charset="0"/>
+              </a:rPr>
+              <a:t> -v </a:t>
+            </a:r>
+            <a:r>
+              <a:rPr lang="en-US" sz="1400" spc="-60" dirty="0">
+                <a:solidFill>
+                  <a:srgbClr val="383838"/>
+                </a:solidFill>
+                <a:highlight>
+                  <a:srgbClr val="FFFF00"/>
+                </a:highlight>
+                <a:latin typeface="Courier New" panose="02070309020205020404" pitchFamily="49" charset="0"/>
+                <a:cs typeface="Courier New" panose="02070309020205020404" pitchFamily="49" charset="0"/>
+              </a:rPr>
+              <a:t>/</a:t>
+            </a:r>
+            <a:r>
+              <a:rPr lang="en-US" sz="1400" spc="-60" dirty="0" err="1">
+                <a:solidFill>
+                  <a:srgbClr val="383838"/>
+                </a:solidFill>
+                <a:highlight>
+                  <a:srgbClr val="FFFF00"/>
+                </a:highlight>
+                <a:latin typeface="Courier New" panose="02070309020205020404" pitchFamily="49" charset="0"/>
+                <a:cs typeface="Courier New" panose="02070309020205020404" pitchFamily="49" charset="0"/>
+              </a:rPr>
+              <a:t>usr</a:t>
+            </a:r>
+            <a:r>
+              <a:rPr lang="en-US" sz="1400" spc="-60" dirty="0">
+                <a:solidFill>
+                  <a:srgbClr val="383838"/>
+                </a:solidFill>
+                <a:highlight>
+                  <a:srgbClr val="FFFF00"/>
+                </a:highlight>
+                <a:latin typeface="Courier New" panose="02070309020205020404" pitchFamily="49" charset="0"/>
+                <a:cs typeface="Courier New" panose="02070309020205020404" pitchFamily="49" charset="0"/>
+              </a:rPr>
+              <a:t>/local/graphite</a:t>
+            </a:r>
+            <a:r>
+              <a:rPr lang="en-US" sz="1400" spc="-60" dirty="0">
+                <a:solidFill>
+                  <a:srgbClr val="383838"/>
+                </a:solidFill>
+                <a:latin typeface="Courier New" panose="02070309020205020404" pitchFamily="49" charset="0"/>
+                <a:cs typeface="Courier New" panose="02070309020205020404" pitchFamily="49" charset="0"/>
+              </a:rPr>
+              <a:t>/log:/var/log \</a:t>
+            </a:r>
+          </a:p>
+          <a:p>
+            <a:pPr marL="298449" marR="5079" indent="-285750">
+              <a:lnSpc>
+                <a:spcPct val="100000"/>
+              </a:lnSpc>
+              <a:spcBef>
+                <a:spcPts val="0"/>
+              </a:spcBef>
+              <a:spcAft>
+                <a:spcPts val="1200"/>
+              </a:spcAft>
+              <a:buFont typeface="Arial" panose="020B0604020202020204" pitchFamily="34" charset="0"/>
+              <a:buChar char="•"/>
+            </a:pPr>
+            <a:r>
+              <a:rPr lang="en-US" sz="1800" b="1" spc="-60" dirty="0">
+                <a:solidFill>
+                  <a:srgbClr val="383838"/>
+                </a:solidFill>
+                <a:latin typeface="Avenir Book" panose="02000503020000020003" pitchFamily="2" charset="0"/>
+                <a:cs typeface="Courier New" panose="02070309020205020404" pitchFamily="49" charset="0"/>
+              </a:rPr>
+              <a:t>Edit </a:t>
+            </a:r>
+            <a:r>
+              <a:rPr lang="en-US" sz="1800" spc="-60" dirty="0">
+                <a:solidFill>
+                  <a:srgbClr val="383838"/>
+                </a:solidFill>
+                <a:latin typeface="Courier New" panose="02070309020205020404" pitchFamily="49" charset="0"/>
+                <a:cs typeface="Courier New" panose="02070309020205020404" pitchFamily="49" charset="0"/>
+              </a:rPr>
+              <a:t>/</a:t>
+            </a:r>
+            <a:r>
+              <a:rPr lang="en-US" sz="1800" spc="-60" dirty="0" err="1">
+                <a:solidFill>
+                  <a:srgbClr val="383838"/>
+                </a:solidFill>
+                <a:latin typeface="Courier New" panose="02070309020205020404" pitchFamily="49" charset="0"/>
+                <a:cs typeface="Courier New" panose="02070309020205020404" pitchFamily="49" charset="0"/>
+              </a:rPr>
+              <a:t>usr</a:t>
+            </a:r>
+            <a:r>
+              <a:rPr lang="en-US" sz="1800" spc="-60" dirty="0">
+                <a:solidFill>
+                  <a:srgbClr val="383838"/>
+                </a:solidFill>
+                <a:latin typeface="Courier New" panose="02070309020205020404" pitchFamily="49" charset="0"/>
+                <a:cs typeface="Courier New" panose="02070309020205020404" pitchFamily="49" charset="0"/>
+              </a:rPr>
+              <a:t>/local/graphite/</a:t>
+            </a:r>
+            <a:r>
+              <a:rPr lang="en-US" sz="1800" spc="-60" dirty="0" err="1">
+                <a:solidFill>
+                  <a:srgbClr val="383838"/>
+                </a:solidFill>
+                <a:latin typeface="Courier New" panose="02070309020205020404" pitchFamily="49" charset="0"/>
+                <a:cs typeface="Courier New" panose="02070309020205020404" pitchFamily="49" charset="0"/>
+              </a:rPr>
+              <a:t>sqlite.sh</a:t>
+            </a:r>
+            <a:r>
+              <a:rPr lang="en-US" sz="1800" spc="-60" dirty="0">
+                <a:solidFill>
+                  <a:srgbClr val="383838"/>
+                </a:solidFill>
+                <a:latin typeface="Courier New" panose="02070309020205020404" pitchFamily="49" charset="0"/>
+                <a:cs typeface="Courier New" panose="02070309020205020404" pitchFamily="49" charset="0"/>
+              </a:rPr>
+              <a:t> </a:t>
+            </a:r>
+            <a:r>
+              <a:rPr lang="en-US" sz="1800" b="1" spc="-60" dirty="0">
+                <a:solidFill>
+                  <a:srgbClr val="383838"/>
+                </a:solidFill>
+                <a:latin typeface="Avenir Book" panose="02000503020000020003" pitchFamily="2" charset="0"/>
+                <a:cs typeface="Courier New" panose="02070309020205020404" pitchFamily="49" charset="0"/>
+              </a:rPr>
+              <a:t>and change the highlighted text to </a:t>
+            </a:r>
+            <a:r>
+              <a:rPr lang="en-US" sz="1800" spc="-60" dirty="0">
+                <a:solidFill>
+                  <a:srgbClr val="383838"/>
+                </a:solidFill>
+                <a:latin typeface="Courier New" panose="02070309020205020404" pitchFamily="49" charset="0"/>
+                <a:cs typeface="Courier New" panose="02070309020205020404" pitchFamily="49" charset="0"/>
+              </a:rPr>
+              <a:t>/</a:t>
+            </a:r>
+            <a:r>
+              <a:rPr lang="en-US" sz="1800" spc="-60" dirty="0" err="1">
+                <a:solidFill>
+                  <a:srgbClr val="383838"/>
+                </a:solidFill>
+                <a:latin typeface="Courier New" panose="02070309020205020404" pitchFamily="49" charset="0"/>
+                <a:cs typeface="Courier New" panose="02070309020205020404" pitchFamily="49" charset="0"/>
+              </a:rPr>
+              <a:t>mnt</a:t>
+            </a:r>
+            <a:r>
+              <a:rPr lang="en-US" sz="1800" spc="-60" dirty="0">
+                <a:solidFill>
+                  <a:srgbClr val="383838"/>
+                </a:solidFill>
+                <a:latin typeface="Courier New" panose="02070309020205020404" pitchFamily="49" charset="0"/>
+                <a:cs typeface="Courier New" panose="02070309020205020404" pitchFamily="49" charset="0"/>
+              </a:rPr>
+              <a:t>/data</a:t>
+            </a:r>
+          </a:p>
+          <a:p>
+            <a:pPr marL="755649" marR="5079" lvl="1" indent="-285750">
+              <a:lnSpc>
+                <a:spcPct val="100000"/>
+              </a:lnSpc>
+              <a:spcBef>
+                <a:spcPts val="0"/>
+              </a:spcBef>
+              <a:spcAft>
+                <a:spcPts val="1200"/>
+              </a:spcAft>
+              <a:buFont typeface="Arial" panose="020B0604020202020204" pitchFamily="34" charset="0"/>
+              <a:buChar char="•"/>
+            </a:pPr>
+            <a:r>
+              <a:rPr lang="en-US" sz="1400" spc="-60" dirty="0">
+                <a:solidFill>
+                  <a:srgbClr val="383838"/>
+                </a:solidFill>
+                <a:latin typeface="Courier New" panose="02070309020205020404" pitchFamily="49" charset="0"/>
+                <a:cs typeface="Courier New" panose="02070309020205020404" pitchFamily="49" charset="0"/>
+              </a:rPr>
+              <a:t>sqlite3 </a:t>
+            </a:r>
+            <a:r>
+              <a:rPr lang="en-US" sz="1400" spc="-60" dirty="0">
+                <a:solidFill>
+                  <a:srgbClr val="383838"/>
+                </a:solidFill>
+                <a:highlight>
+                  <a:srgbClr val="FFFF00"/>
+                </a:highlight>
+                <a:latin typeface="Courier New" panose="02070309020205020404" pitchFamily="49" charset="0"/>
+                <a:cs typeface="Courier New" panose="02070309020205020404" pitchFamily="49" charset="0"/>
+              </a:rPr>
+              <a:t>/</a:t>
+            </a:r>
+            <a:r>
+              <a:rPr lang="en-US" sz="1400" spc="-60" dirty="0" err="1">
+                <a:solidFill>
+                  <a:srgbClr val="383838"/>
+                </a:solidFill>
+                <a:highlight>
+                  <a:srgbClr val="FFFF00"/>
+                </a:highlight>
+                <a:latin typeface="Courier New" panose="02070309020205020404" pitchFamily="49" charset="0"/>
+                <a:cs typeface="Courier New" panose="02070309020205020404" pitchFamily="49" charset="0"/>
+              </a:rPr>
+              <a:t>usr</a:t>
+            </a:r>
+            <a:r>
+              <a:rPr lang="en-US" sz="1400" spc="-60" dirty="0">
+                <a:solidFill>
+                  <a:srgbClr val="383838"/>
+                </a:solidFill>
+                <a:highlight>
+                  <a:srgbClr val="FFFF00"/>
+                </a:highlight>
+                <a:latin typeface="Courier New" panose="02070309020205020404" pitchFamily="49" charset="0"/>
+                <a:cs typeface="Courier New" panose="02070309020205020404" pitchFamily="49" charset="0"/>
+              </a:rPr>
+              <a:t>/local/graphite</a:t>
+            </a:r>
+            <a:r>
+              <a:rPr lang="en-US" sz="1400" spc="-60" dirty="0">
+                <a:solidFill>
+                  <a:srgbClr val="383838"/>
+                </a:solidFill>
+                <a:latin typeface="Courier New" panose="02070309020205020404" pitchFamily="49" charset="0"/>
+                <a:cs typeface="Courier New" panose="02070309020205020404" pitchFamily="49" charset="0"/>
+              </a:rPr>
+              <a:t>/graphite-storage/</a:t>
+            </a:r>
+            <a:r>
+              <a:rPr lang="en-US" sz="1400" spc="-60" dirty="0" err="1">
+                <a:solidFill>
+                  <a:srgbClr val="383838"/>
+                </a:solidFill>
+                <a:latin typeface="Courier New" panose="02070309020205020404" pitchFamily="49" charset="0"/>
+                <a:cs typeface="Courier New" panose="02070309020205020404" pitchFamily="49" charset="0"/>
+              </a:rPr>
+              <a:t>graphite.db</a:t>
+            </a:r>
+            <a:r>
+              <a:rPr lang="en-US" sz="1400" spc="-60" dirty="0">
+                <a:solidFill>
+                  <a:srgbClr val="383838"/>
+                </a:solidFill>
+                <a:latin typeface="Courier New" panose="02070309020205020404" pitchFamily="49" charset="0"/>
+                <a:cs typeface="Courier New" panose="02070309020205020404" pitchFamily="49" charset="0"/>
+              </a:rPr>
+              <a:t> &lt; /</a:t>
+            </a:r>
+            <a:r>
+              <a:rPr lang="en-US" sz="1400" spc="-60" dirty="0" err="1">
+                <a:solidFill>
+                  <a:srgbClr val="383838"/>
+                </a:solidFill>
+                <a:latin typeface="Courier New" panose="02070309020205020404" pitchFamily="49" charset="0"/>
+                <a:cs typeface="Courier New" panose="02070309020205020404" pitchFamily="49" charset="0"/>
+              </a:rPr>
+              <a:t>usr</a:t>
+            </a:r>
+            <a:r>
+              <a:rPr lang="en-US" sz="1400" spc="-60" dirty="0">
+                <a:solidFill>
+                  <a:srgbClr val="383838"/>
+                </a:solidFill>
+                <a:latin typeface="Courier New" panose="02070309020205020404" pitchFamily="49" charset="0"/>
+                <a:cs typeface="Courier New" panose="02070309020205020404" pitchFamily="49" charset="0"/>
+              </a:rPr>
+              <a:t>/local/graphite/</a:t>
+            </a:r>
+            <a:r>
+              <a:rPr lang="en-US" sz="1400" spc="-60" dirty="0" err="1">
+                <a:solidFill>
+                  <a:srgbClr val="383838"/>
+                </a:solidFill>
+                <a:latin typeface="Courier New" panose="02070309020205020404" pitchFamily="49" charset="0"/>
+                <a:cs typeface="Courier New" panose="02070309020205020404" pitchFamily="49" charset="0"/>
+              </a:rPr>
+              <a:t>deleteoldevents.sql</a:t>
+            </a:r>
+            <a:r>
+              <a:rPr lang="en-US" sz="1400" spc="-60" dirty="0">
+                <a:solidFill>
+                  <a:srgbClr val="383838"/>
+                </a:solidFill>
+                <a:latin typeface="Courier New" panose="02070309020205020404" pitchFamily="49" charset="0"/>
+                <a:cs typeface="Courier New" panose="02070309020205020404" pitchFamily="49" charset="0"/>
+              </a:rPr>
+              <a:t> &amp;&amp; sqlite3 </a:t>
+            </a:r>
+            <a:r>
+              <a:rPr lang="en-US" sz="1400" spc="-60" dirty="0">
+                <a:solidFill>
+                  <a:srgbClr val="383838"/>
+                </a:solidFill>
+                <a:highlight>
+                  <a:srgbClr val="FFFF00"/>
+                </a:highlight>
+                <a:latin typeface="Courier New" panose="02070309020205020404" pitchFamily="49" charset="0"/>
+                <a:cs typeface="Courier New" panose="02070309020205020404" pitchFamily="49" charset="0"/>
+              </a:rPr>
+              <a:t>/</a:t>
+            </a:r>
+            <a:r>
+              <a:rPr lang="en-US" sz="1400" spc="-60" dirty="0" err="1">
+                <a:solidFill>
+                  <a:srgbClr val="383838"/>
+                </a:solidFill>
+                <a:highlight>
+                  <a:srgbClr val="FFFF00"/>
+                </a:highlight>
+                <a:latin typeface="Courier New" panose="02070309020205020404" pitchFamily="49" charset="0"/>
+                <a:cs typeface="Courier New" panose="02070309020205020404" pitchFamily="49" charset="0"/>
+              </a:rPr>
+              <a:t>usr</a:t>
+            </a:r>
+            <a:r>
+              <a:rPr lang="en-US" sz="1400" spc="-60" dirty="0">
+                <a:solidFill>
+                  <a:srgbClr val="383838"/>
+                </a:solidFill>
+                <a:highlight>
+                  <a:srgbClr val="FFFF00"/>
+                </a:highlight>
+                <a:latin typeface="Courier New" panose="02070309020205020404" pitchFamily="49" charset="0"/>
+                <a:cs typeface="Courier New" panose="02070309020205020404" pitchFamily="49" charset="0"/>
+              </a:rPr>
+              <a:t>/local/graphite</a:t>
+            </a:r>
+            <a:r>
+              <a:rPr lang="en-US" sz="1400" spc="-60" dirty="0">
+                <a:solidFill>
+                  <a:srgbClr val="383838"/>
+                </a:solidFill>
+                <a:latin typeface="Courier New" panose="02070309020205020404" pitchFamily="49" charset="0"/>
+                <a:cs typeface="Courier New" panose="02070309020205020404" pitchFamily="49" charset="0"/>
+              </a:rPr>
+              <a:t>/graphite-storage/</a:t>
+            </a:r>
+            <a:r>
+              <a:rPr lang="en-US" sz="1400" spc="-60" dirty="0" err="1">
+                <a:solidFill>
+                  <a:srgbClr val="383838"/>
+                </a:solidFill>
+                <a:latin typeface="Courier New" panose="02070309020205020404" pitchFamily="49" charset="0"/>
+                <a:cs typeface="Courier New" panose="02070309020205020404" pitchFamily="49" charset="0"/>
+              </a:rPr>
+              <a:t>graphite.db</a:t>
+            </a:r>
+            <a:r>
+              <a:rPr lang="en-US" sz="1400" spc="-60" dirty="0">
+                <a:solidFill>
+                  <a:srgbClr val="383838"/>
+                </a:solidFill>
+                <a:latin typeface="Courier New" panose="02070309020205020404" pitchFamily="49" charset="0"/>
+                <a:cs typeface="Courier New" panose="02070309020205020404" pitchFamily="49" charset="0"/>
+              </a:rPr>
+              <a:t> 'VACUUM;’</a:t>
+            </a:r>
+          </a:p>
+          <a:p>
+            <a:pPr marL="298449" marR="5079" indent="-285750">
+              <a:lnSpc>
+                <a:spcPct val="100000"/>
+              </a:lnSpc>
+              <a:spcBef>
+                <a:spcPts val="0"/>
+              </a:spcBef>
+              <a:spcAft>
+                <a:spcPts val="1200"/>
+              </a:spcAft>
+              <a:buFont typeface="Arial" panose="020B0604020202020204" pitchFamily="34" charset="0"/>
+              <a:buChar char="•"/>
+            </a:pPr>
+            <a:endParaRPr lang="en-US" sz="1800" spc="-60" dirty="0">
+              <a:solidFill>
+                <a:srgbClr val="383838"/>
+              </a:solidFill>
+              <a:latin typeface="Courier New" panose="02070309020205020404" pitchFamily="49" charset="0"/>
+              <a:cs typeface="Courier New" panose="02070309020205020404" pitchFamily="49" charset="0"/>
+            </a:endParaRPr>
+          </a:p>
+        </p:txBody>
+      </p:sp>
+    </p:spTree>
+    <p:extLst>
+      <p:ext uri="{BB962C8B-B14F-4D97-AF65-F5344CB8AC3E}">
+        <p14:creationId xmlns:p14="http://schemas.microsoft.com/office/powerpoint/2010/main" val="3673794798"/>
+      </p:ext>
+    </p:extLst>
+  </p:cSld>
+  <p:clrMapOvr>
+    <a:masterClrMapping/>
+  </p:clrMapOvr>
+</p:sld>
+</file>
+
+<file path=ppt/slides/slide25.xml><?xml version="1.0" encoding="utf-8"?>
+<p:sld xmlns:a="http://schemas.openxmlformats.org/drawingml/2006/main" xmlns:r="http://schemas.openxmlformats.org/officeDocument/2006/relationships" xmlns:p="http://schemas.openxmlformats.org/presentationml/2006/main">
+  <p:cSld>
+    <p:spTree>
+      <p:nvGrpSpPr>
+        <p:cNvPr id="1" name="Shape 196"/>
+        <p:cNvGrpSpPr/>
+        <p:nvPr/>
+      </p:nvGrpSpPr>
+      <p:grpSpPr>
+        <a:xfrm>
+          <a:off x="0" y="0"/>
+          <a:ext cx="0" cy="0"/>
+          <a:chOff x="0" y="0"/>
+          <a:chExt cx="0" cy="0"/>
+        </a:xfrm>
+      </p:grpSpPr>
+      <p:sp>
+        <p:nvSpPr>
+          <p:cNvPr id="197" name="Google Shape;197;p10"/>
+          <p:cNvSpPr txBox="1">
+            <a:spLocks noGrp="1"/>
+          </p:cNvSpPr>
+          <p:nvPr>
+            <p:ph type="title"/>
+          </p:nvPr>
+        </p:nvSpPr>
+        <p:spPr>
+          <a:xfrm>
+            <a:off x="540000" y="540001"/>
+            <a:ext cx="9230301" cy="588712"/>
+          </a:xfrm>
+          <a:prstGeom prst="rect">
+            <a:avLst/>
+          </a:prstGeom>
+          <a:noFill/>
+          <a:ln>
+            <a:noFill/>
+          </a:ln>
+        </p:spPr>
+        <p:txBody>
+          <a:bodyPr spcFirstLastPara="1" wrap="square" lIns="0" tIns="0" rIns="0" bIns="0" anchor="t" anchorCtr="0">
+            <a:noAutofit/>
+          </a:bodyPr>
+          <a:lstStyle/>
+          <a:p>
+            <a:pPr marL="0" lvl="0" indent="0" algn="l" rtl="0">
+              <a:lnSpc>
+                <a:spcPct val="90000"/>
+              </a:lnSpc>
+              <a:spcBef>
+                <a:spcPts val="0"/>
+              </a:spcBef>
+              <a:spcAft>
+                <a:spcPts val="0"/>
+              </a:spcAft>
+              <a:buClr>
+                <a:srgbClr val="0099CC"/>
+              </a:buClr>
+              <a:buSzPts val="3600"/>
+              <a:buFont typeface="Arial"/>
+              <a:buNone/>
+            </a:pPr>
+            <a:r>
+              <a:rPr lang="en-US" b="0" dirty="0">
+                <a:latin typeface="Avenir Medium" panose="02000503020000020003" pitchFamily="2" charset="0"/>
+              </a:rPr>
+              <a:t>Implementing an External Storage Volume</a:t>
+            </a:r>
+            <a:endParaRPr b="0" dirty="0">
+              <a:latin typeface="Avenir Medium" panose="02000503020000020003" pitchFamily="2" charset="0"/>
+            </a:endParaRPr>
+          </a:p>
+        </p:txBody>
+      </p:sp>
+      <p:sp>
+        <p:nvSpPr>
+          <p:cNvPr id="14" name="Google Shape;198;p10">
+            <a:extLst>
+              <a:ext uri="{FF2B5EF4-FFF2-40B4-BE49-F238E27FC236}">
+                <a16:creationId xmlns:a16="http://schemas.microsoft.com/office/drawing/2014/main" id="{ADF47C86-3730-8F43-AF64-4FD21181E7A8}"/>
+              </a:ext>
+            </a:extLst>
+          </p:cNvPr>
+          <p:cNvSpPr txBox="1">
+            <a:spLocks noGrp="1"/>
+          </p:cNvSpPr>
+          <p:nvPr>
+            <p:ph type="body" idx="1"/>
+          </p:nvPr>
+        </p:nvSpPr>
+        <p:spPr>
+          <a:xfrm>
+            <a:off x="540000" y="1128713"/>
+            <a:ext cx="11310624" cy="5345239"/>
+          </a:xfrm>
+          <a:prstGeom prst="rect">
+            <a:avLst/>
+          </a:prstGeom>
+          <a:noFill/>
+          <a:ln>
+            <a:noFill/>
+          </a:ln>
+        </p:spPr>
+        <p:txBody>
+          <a:bodyPr spcFirstLastPara="1" wrap="square" lIns="0" tIns="0" rIns="0" bIns="0" anchor="t" anchorCtr="0">
+            <a:noAutofit/>
+          </a:bodyPr>
+          <a:lstStyle/>
+          <a:p>
+            <a:pPr marL="298449" marR="5079" indent="-285750">
+              <a:lnSpc>
+                <a:spcPct val="100000"/>
+              </a:lnSpc>
+              <a:spcBef>
+                <a:spcPts val="0"/>
+              </a:spcBef>
+              <a:spcAft>
+                <a:spcPts val="1200"/>
+              </a:spcAft>
+              <a:buFont typeface="Arial" panose="020B0604020202020204" pitchFamily="34" charset="0"/>
+              <a:buChar char="•"/>
+            </a:pPr>
+            <a:r>
+              <a:rPr lang="en-US" sz="1800" b="1" spc="-60" dirty="0">
+                <a:solidFill>
+                  <a:srgbClr val="383838"/>
+                </a:solidFill>
+                <a:latin typeface="Avenir Book" panose="02000503020000020003" pitchFamily="2" charset="0"/>
+                <a:cs typeface="Courier New" panose="02070309020205020404" pitchFamily="49" charset="0"/>
+              </a:rPr>
+              <a:t>The following files must be modified on the Jump server</a:t>
+            </a:r>
+          </a:p>
+          <a:p>
+            <a:pPr marL="298449" marR="5079" indent="-285750">
+              <a:lnSpc>
+                <a:spcPct val="100000"/>
+              </a:lnSpc>
+              <a:spcBef>
+                <a:spcPts val="0"/>
+              </a:spcBef>
+              <a:spcAft>
+                <a:spcPts val="1200"/>
+              </a:spcAft>
+              <a:buFont typeface="Arial" panose="020B0604020202020204" pitchFamily="34" charset="0"/>
+              <a:buChar char="•"/>
+            </a:pPr>
+            <a:r>
+              <a:rPr lang="en-US" sz="1800" b="1" spc="-60" dirty="0">
+                <a:solidFill>
+                  <a:srgbClr val="383838"/>
+                </a:solidFill>
+                <a:latin typeface="Avenir Book" panose="02000503020000020003" pitchFamily="2" charset="0"/>
+                <a:cs typeface="Courier New" panose="02070309020205020404" pitchFamily="49" charset="0"/>
+              </a:rPr>
+              <a:t>Edit </a:t>
+            </a:r>
+            <a:r>
+              <a:rPr lang="en-US" sz="1800" spc="-60" dirty="0">
+                <a:solidFill>
+                  <a:srgbClr val="383838"/>
+                </a:solidFill>
+                <a:latin typeface="Courier New" panose="02070309020205020404" pitchFamily="49" charset="0"/>
+                <a:cs typeface="Courier New" panose="02070309020205020404" pitchFamily="49" charset="0"/>
+              </a:rPr>
+              <a:t>/</a:t>
+            </a:r>
+            <a:r>
+              <a:rPr lang="en-US" sz="1800" spc="-60" dirty="0" err="1">
+                <a:solidFill>
+                  <a:srgbClr val="383838"/>
+                </a:solidFill>
+                <a:latin typeface="Courier New" panose="02070309020205020404" pitchFamily="49" charset="0"/>
+                <a:cs typeface="Courier New" panose="02070309020205020404" pitchFamily="49" charset="0"/>
+              </a:rPr>
+              <a:t>usr</a:t>
+            </a:r>
+            <a:r>
+              <a:rPr lang="en-US" sz="1800" spc="-60" dirty="0">
+                <a:solidFill>
+                  <a:srgbClr val="383838"/>
+                </a:solidFill>
+                <a:latin typeface="Courier New" panose="02070309020205020404" pitchFamily="49" charset="0"/>
+                <a:cs typeface="Courier New" panose="02070309020205020404" pitchFamily="49" charset="0"/>
+              </a:rPr>
+              <a:t>/local/</a:t>
+            </a:r>
+            <a:r>
+              <a:rPr lang="en-US" sz="1800" spc="-60" dirty="0" err="1">
+                <a:solidFill>
+                  <a:srgbClr val="383838"/>
+                </a:solidFill>
+                <a:latin typeface="Courier New" panose="02070309020205020404" pitchFamily="49" charset="0"/>
+                <a:cs typeface="Courier New" panose="02070309020205020404" pitchFamily="49" charset="0"/>
+              </a:rPr>
+              <a:t>sitespeed</a:t>
+            </a:r>
+            <a:r>
+              <a:rPr lang="en-US" sz="1800" spc="-60" dirty="0">
+                <a:solidFill>
+                  <a:srgbClr val="383838"/>
+                </a:solidFill>
+                <a:latin typeface="Courier New" panose="02070309020205020404" pitchFamily="49" charset="0"/>
+                <a:cs typeface="Courier New" panose="02070309020205020404" pitchFamily="49" charset="0"/>
+              </a:rPr>
+              <a:t>/admin.sh </a:t>
+            </a:r>
+            <a:r>
+              <a:rPr lang="en-US" sz="1800" b="1" spc="-60" dirty="0">
+                <a:solidFill>
+                  <a:srgbClr val="383838"/>
+                </a:solidFill>
+                <a:latin typeface="Avenir Book" panose="02000503020000020003" pitchFamily="2" charset="0"/>
+                <a:cs typeface="Courier New" panose="02070309020205020404" pitchFamily="49" charset="0"/>
+              </a:rPr>
+              <a:t>and change the highlighted text to </a:t>
+            </a:r>
+            <a:r>
+              <a:rPr lang="en-US" sz="1800" spc="-60" dirty="0">
+                <a:solidFill>
+                  <a:srgbClr val="383838"/>
+                </a:solidFill>
+                <a:latin typeface="Courier New" panose="02070309020205020404" pitchFamily="49" charset="0"/>
+                <a:cs typeface="Courier New" panose="02070309020205020404" pitchFamily="49" charset="0"/>
+              </a:rPr>
+              <a:t>/</a:t>
+            </a:r>
+            <a:r>
+              <a:rPr lang="en-US" sz="1800" spc="-60" dirty="0" err="1">
+                <a:solidFill>
+                  <a:srgbClr val="383838"/>
+                </a:solidFill>
+                <a:latin typeface="Courier New" panose="02070309020205020404" pitchFamily="49" charset="0"/>
+                <a:cs typeface="Courier New" panose="02070309020205020404" pitchFamily="49" charset="0"/>
+              </a:rPr>
+              <a:t>mnt</a:t>
+            </a:r>
+            <a:r>
+              <a:rPr lang="en-US" sz="1800" spc="-60" dirty="0">
+                <a:solidFill>
+                  <a:srgbClr val="383838"/>
+                </a:solidFill>
+                <a:latin typeface="Courier New" panose="02070309020205020404" pitchFamily="49" charset="0"/>
+                <a:cs typeface="Courier New" panose="02070309020205020404" pitchFamily="49" charset="0"/>
+              </a:rPr>
+              <a:t>/data</a:t>
+            </a:r>
+          </a:p>
+          <a:p>
+            <a:pPr marL="755649" marR="5079" lvl="1" indent="-285750">
+              <a:lnSpc>
+                <a:spcPct val="100000"/>
+              </a:lnSpc>
+              <a:spcBef>
+                <a:spcPts val="0"/>
+              </a:spcBef>
+              <a:spcAft>
+                <a:spcPts val="1200"/>
+              </a:spcAft>
+              <a:buFont typeface="Arial" panose="020B0604020202020204" pitchFamily="34" charset="0"/>
+              <a:buChar char="•"/>
+            </a:pPr>
+            <a:r>
+              <a:rPr lang="en-US" sz="1400" spc="-60" dirty="0" err="1">
+                <a:solidFill>
+                  <a:srgbClr val="383838"/>
+                </a:solidFill>
+                <a:latin typeface="Courier New" panose="02070309020205020404" pitchFamily="49" charset="0"/>
+                <a:cs typeface="Courier New" panose="02070309020205020404" pitchFamily="49" charset="0"/>
+              </a:rPr>
+              <a:t>ssh</a:t>
+            </a:r>
+            <a:r>
+              <a:rPr lang="en-US" sz="1400" spc="-60" dirty="0">
+                <a:solidFill>
+                  <a:srgbClr val="383838"/>
+                </a:solidFill>
+                <a:latin typeface="Courier New" panose="02070309020205020404" pitchFamily="49" charset="0"/>
+                <a:cs typeface="Courier New" panose="02070309020205020404" pitchFamily="49" charset="0"/>
+              </a:rPr>
+              <a:t> -</a:t>
+            </a:r>
+            <a:r>
+              <a:rPr lang="en-US" sz="1400" spc="-60" dirty="0" err="1">
+                <a:solidFill>
+                  <a:srgbClr val="383838"/>
+                </a:solidFill>
+                <a:latin typeface="Courier New" panose="02070309020205020404" pitchFamily="49" charset="0"/>
+                <a:cs typeface="Courier New" panose="02070309020205020404" pitchFamily="49" charset="0"/>
+              </a:rPr>
+              <a:t>i</a:t>
+            </a:r>
+            <a:r>
+              <a:rPr lang="en-US" sz="1400" spc="-60" dirty="0">
+                <a:solidFill>
+                  <a:srgbClr val="383838"/>
+                </a:solidFill>
+                <a:latin typeface="Courier New" panose="02070309020205020404" pitchFamily="49" charset="0"/>
+                <a:cs typeface="Courier New" panose="02070309020205020404" pitchFamily="49" charset="0"/>
+              </a:rPr>
+              <a:t> $Key $(</a:t>
+            </a:r>
+            <a:r>
+              <a:rPr lang="en-US" sz="1400" spc="-60" dirty="0" err="1">
+                <a:solidFill>
+                  <a:srgbClr val="383838"/>
+                </a:solidFill>
+                <a:latin typeface="Courier New" panose="02070309020205020404" pitchFamily="49" charset="0"/>
+                <a:cs typeface="Courier New" panose="02070309020205020404" pitchFamily="49" charset="0"/>
+              </a:rPr>
+              <a:t>whoami</a:t>
+            </a:r>
+            <a:r>
+              <a:rPr lang="en-US" sz="1400" spc="-60" dirty="0">
+                <a:solidFill>
+                  <a:srgbClr val="383838"/>
+                </a:solidFill>
+                <a:latin typeface="Courier New" panose="02070309020205020404" pitchFamily="49" charset="0"/>
+                <a:cs typeface="Courier New" panose="02070309020205020404" pitchFamily="49" charset="0"/>
+              </a:rPr>
+              <a:t>)@</a:t>
+            </a:r>
+            <a:r>
+              <a:rPr lang="en-US" sz="1400" spc="-60" dirty="0" err="1">
+                <a:solidFill>
+                  <a:srgbClr val="383838"/>
+                </a:solidFill>
+                <a:latin typeface="Courier New" panose="02070309020205020404" pitchFamily="49" charset="0"/>
+                <a:cs typeface="Courier New" panose="02070309020205020404" pitchFamily="49" charset="0"/>
+              </a:rPr>
+              <a:t>graphite.$Domain</a:t>
+            </a:r>
+            <a:r>
+              <a:rPr lang="en-US" sz="1400" spc="-60" dirty="0">
+                <a:solidFill>
+                  <a:srgbClr val="383838"/>
+                </a:solidFill>
+                <a:latin typeface="Courier New" panose="02070309020205020404" pitchFamily="49" charset="0"/>
+                <a:cs typeface="Courier New" panose="02070309020205020404" pitchFamily="49" charset="0"/>
+              </a:rPr>
+              <a:t> du -</a:t>
+            </a:r>
+            <a:r>
+              <a:rPr lang="en-US" sz="1400" spc="-60" dirty="0" err="1">
+                <a:solidFill>
+                  <a:srgbClr val="383838"/>
+                </a:solidFill>
+                <a:latin typeface="Courier New" panose="02070309020205020404" pitchFamily="49" charset="0"/>
+                <a:cs typeface="Courier New" panose="02070309020205020404" pitchFamily="49" charset="0"/>
+              </a:rPr>
+              <a:t>sh</a:t>
+            </a:r>
+            <a:r>
+              <a:rPr lang="en-US" sz="1400" spc="-60" dirty="0">
+                <a:solidFill>
+                  <a:srgbClr val="383838"/>
+                </a:solidFill>
+                <a:latin typeface="Courier New" panose="02070309020205020404" pitchFamily="49" charset="0"/>
+                <a:cs typeface="Courier New" panose="02070309020205020404" pitchFamily="49" charset="0"/>
+              </a:rPr>
+              <a:t> </a:t>
+            </a:r>
+            <a:r>
+              <a:rPr lang="en-US" sz="1400" spc="-60" dirty="0">
+                <a:solidFill>
+                  <a:srgbClr val="383838"/>
+                </a:solidFill>
+                <a:highlight>
+                  <a:srgbClr val="FFFF00"/>
+                </a:highlight>
+                <a:latin typeface="Courier New" panose="02070309020205020404" pitchFamily="49" charset="0"/>
+                <a:cs typeface="Courier New" panose="02070309020205020404" pitchFamily="49" charset="0"/>
+              </a:rPr>
+              <a:t>/</a:t>
+            </a:r>
+            <a:r>
+              <a:rPr lang="en-US" sz="1400" spc="-60" dirty="0" err="1">
+                <a:solidFill>
+                  <a:srgbClr val="383838"/>
+                </a:solidFill>
+                <a:highlight>
+                  <a:srgbClr val="FFFF00"/>
+                </a:highlight>
+                <a:latin typeface="Courier New" panose="02070309020205020404" pitchFamily="49" charset="0"/>
+                <a:cs typeface="Courier New" panose="02070309020205020404" pitchFamily="49" charset="0"/>
+              </a:rPr>
+              <a:t>usr</a:t>
+            </a:r>
+            <a:r>
+              <a:rPr lang="en-US" sz="1400" spc="-60" dirty="0">
+                <a:solidFill>
+                  <a:srgbClr val="383838"/>
+                </a:solidFill>
+                <a:highlight>
+                  <a:srgbClr val="FFFF00"/>
+                </a:highlight>
+                <a:latin typeface="Courier New" panose="02070309020205020404" pitchFamily="49" charset="0"/>
+                <a:cs typeface="Courier New" panose="02070309020205020404" pitchFamily="49" charset="0"/>
+              </a:rPr>
+              <a:t>/local/graphite</a:t>
+            </a:r>
+            <a:r>
+              <a:rPr lang="en-US" sz="1400" spc="-60" dirty="0">
+                <a:solidFill>
+                  <a:srgbClr val="383838"/>
+                </a:solidFill>
+                <a:latin typeface="Courier New" panose="02070309020205020404" pitchFamily="49" charset="0"/>
+                <a:cs typeface="Courier New" panose="02070309020205020404" pitchFamily="49" charset="0"/>
+              </a:rPr>
+              <a:t>/graphite-storage/</a:t>
+            </a:r>
+            <a:r>
+              <a:rPr lang="en-US" sz="1400" spc="-60" dirty="0" err="1">
+                <a:solidFill>
+                  <a:srgbClr val="383838"/>
+                </a:solidFill>
+                <a:latin typeface="Courier New" panose="02070309020205020404" pitchFamily="49" charset="0"/>
+                <a:cs typeface="Courier New" panose="02070309020205020404" pitchFamily="49" charset="0"/>
+              </a:rPr>
+              <a:t>graphite.db</a:t>
+            </a:r>
+            <a:r>
+              <a:rPr lang="en-US" sz="1400" spc="-60" dirty="0">
+                <a:solidFill>
+                  <a:srgbClr val="383838"/>
+                </a:solidFill>
+                <a:latin typeface="Courier New" panose="02070309020205020404" pitchFamily="49" charset="0"/>
+                <a:cs typeface="Courier New" panose="02070309020205020404" pitchFamily="49" charset="0"/>
+              </a:rPr>
+              <a:t> </a:t>
+            </a:r>
+          </a:p>
+          <a:p>
+            <a:pPr marL="298449" marR="5079" indent="-285750">
+              <a:lnSpc>
+                <a:spcPct val="100000"/>
+              </a:lnSpc>
+              <a:spcBef>
+                <a:spcPts val="0"/>
+              </a:spcBef>
+              <a:spcAft>
+                <a:spcPts val="1200"/>
+              </a:spcAft>
+              <a:buFont typeface="Arial" panose="020B0604020202020204" pitchFamily="34" charset="0"/>
+              <a:buChar char="•"/>
+            </a:pPr>
+            <a:r>
+              <a:rPr lang="en-US" sz="1800" b="1" spc="-60" dirty="0">
+                <a:solidFill>
+                  <a:srgbClr val="383838"/>
+                </a:solidFill>
+                <a:latin typeface="Avenir Book" panose="02000503020000020003" pitchFamily="2" charset="0"/>
+                <a:cs typeface="Courier New" panose="02070309020205020404" pitchFamily="49" charset="0"/>
+              </a:rPr>
+              <a:t>Edit </a:t>
+            </a:r>
+            <a:r>
+              <a:rPr lang="en-US" sz="1800" spc="-60" dirty="0">
+                <a:solidFill>
+                  <a:srgbClr val="383838"/>
+                </a:solidFill>
+                <a:latin typeface="Courier New" panose="02070309020205020404" pitchFamily="49" charset="0"/>
+                <a:cs typeface="Courier New" panose="02070309020205020404" pitchFamily="49" charset="0"/>
+              </a:rPr>
+              <a:t>/</a:t>
+            </a:r>
+            <a:r>
+              <a:rPr lang="en-US" sz="1800" spc="-60" dirty="0" err="1">
+                <a:solidFill>
+                  <a:srgbClr val="383838"/>
+                </a:solidFill>
+                <a:latin typeface="Courier New" panose="02070309020205020404" pitchFamily="49" charset="0"/>
+                <a:cs typeface="Courier New" panose="02070309020205020404" pitchFamily="49" charset="0"/>
+              </a:rPr>
+              <a:t>usr</a:t>
+            </a:r>
+            <a:r>
+              <a:rPr lang="en-US" sz="1800" spc="-60" dirty="0">
+                <a:solidFill>
+                  <a:srgbClr val="383838"/>
+                </a:solidFill>
+                <a:latin typeface="Courier New" panose="02070309020205020404" pitchFamily="49" charset="0"/>
+                <a:cs typeface="Courier New" panose="02070309020205020404" pitchFamily="49" charset="0"/>
+              </a:rPr>
+              <a:t>/local/</a:t>
+            </a:r>
+            <a:r>
+              <a:rPr lang="en-US" sz="1800" spc="-60" dirty="0" err="1">
+                <a:solidFill>
+                  <a:srgbClr val="383838"/>
+                </a:solidFill>
+                <a:latin typeface="Courier New" panose="02070309020205020404" pitchFamily="49" charset="0"/>
+                <a:cs typeface="Courier New" panose="02070309020205020404" pitchFamily="49" charset="0"/>
+              </a:rPr>
+              <a:t>sitespeed</a:t>
+            </a:r>
+            <a:r>
+              <a:rPr lang="en-US" sz="1800" spc="-60" dirty="0">
+                <a:solidFill>
+                  <a:srgbClr val="383838"/>
+                </a:solidFill>
+                <a:latin typeface="Courier New" panose="02070309020205020404" pitchFamily="49" charset="0"/>
+                <a:cs typeface="Courier New" panose="02070309020205020404" pitchFamily="49" charset="0"/>
+              </a:rPr>
+              <a:t>/</a:t>
+            </a:r>
+            <a:r>
+              <a:rPr lang="en-US" sz="1800" spc="-60" dirty="0" err="1">
+                <a:solidFill>
+                  <a:srgbClr val="383838"/>
+                </a:solidFill>
+                <a:latin typeface="Courier New" panose="02070309020205020404" pitchFamily="49" charset="0"/>
+                <a:cs typeface="Courier New" panose="02070309020205020404" pitchFamily="49" charset="0"/>
+              </a:rPr>
+              <a:t>maintenance.sh</a:t>
+            </a:r>
+            <a:r>
+              <a:rPr lang="en-US" sz="1800" spc="-60" dirty="0">
+                <a:solidFill>
+                  <a:srgbClr val="383838"/>
+                </a:solidFill>
+                <a:latin typeface="Courier New" panose="02070309020205020404" pitchFamily="49" charset="0"/>
+                <a:cs typeface="Courier New" panose="02070309020205020404" pitchFamily="49" charset="0"/>
+              </a:rPr>
+              <a:t> </a:t>
+            </a:r>
+            <a:r>
+              <a:rPr lang="en-US" sz="1800" b="1" spc="-60" dirty="0">
+                <a:solidFill>
+                  <a:srgbClr val="383838"/>
+                </a:solidFill>
+                <a:latin typeface="Avenir Book" panose="02000503020000020003" pitchFamily="2" charset="0"/>
+                <a:cs typeface="Courier New" panose="02070309020205020404" pitchFamily="49" charset="0"/>
+              </a:rPr>
+              <a:t>and change the highlighted text to </a:t>
+            </a:r>
+            <a:r>
+              <a:rPr lang="en-US" sz="1800" spc="-60" dirty="0">
+                <a:solidFill>
+                  <a:srgbClr val="383838"/>
+                </a:solidFill>
+                <a:latin typeface="Courier New" panose="02070309020205020404" pitchFamily="49" charset="0"/>
+                <a:cs typeface="Courier New" panose="02070309020205020404" pitchFamily="49" charset="0"/>
+              </a:rPr>
+              <a:t>/</a:t>
+            </a:r>
+            <a:r>
+              <a:rPr lang="en-US" sz="1800" spc="-60" dirty="0" err="1">
+                <a:solidFill>
+                  <a:srgbClr val="383838"/>
+                </a:solidFill>
+                <a:latin typeface="Courier New" panose="02070309020205020404" pitchFamily="49" charset="0"/>
+                <a:cs typeface="Courier New" panose="02070309020205020404" pitchFamily="49" charset="0"/>
+              </a:rPr>
+              <a:t>mnt</a:t>
+            </a:r>
+            <a:r>
+              <a:rPr lang="en-US" sz="1800" spc="-60" dirty="0">
+                <a:solidFill>
+                  <a:srgbClr val="383838"/>
+                </a:solidFill>
+                <a:latin typeface="Courier New" panose="02070309020205020404" pitchFamily="49" charset="0"/>
+                <a:cs typeface="Courier New" panose="02070309020205020404" pitchFamily="49" charset="0"/>
+              </a:rPr>
+              <a:t>/data</a:t>
+            </a:r>
+          </a:p>
+          <a:p>
+            <a:pPr marL="755649" marR="5079" lvl="1" indent="-285750">
+              <a:lnSpc>
+                <a:spcPct val="100000"/>
+              </a:lnSpc>
+              <a:spcBef>
+                <a:spcPts val="0"/>
+              </a:spcBef>
+              <a:spcAft>
+                <a:spcPts val="1200"/>
+              </a:spcAft>
+              <a:buFont typeface="Arial" panose="020B0604020202020204" pitchFamily="34" charset="0"/>
+              <a:buChar char="•"/>
+            </a:pPr>
+            <a:r>
+              <a:rPr lang="en-US" sz="1400" spc="-60" dirty="0">
+                <a:solidFill>
+                  <a:srgbClr val="383838"/>
+                </a:solidFill>
+                <a:latin typeface="Courier New" panose="02070309020205020404" pitchFamily="49" charset="0"/>
+                <a:cs typeface="Courier New" panose="02070309020205020404" pitchFamily="49" charset="0"/>
+              </a:rPr>
+              <a:t>echo "</a:t>
+            </a:r>
+            <a:r>
+              <a:rPr lang="en-US" sz="1400" spc="-60" dirty="0" err="1">
+                <a:solidFill>
+                  <a:srgbClr val="383838"/>
+                </a:solidFill>
+                <a:latin typeface="Courier New" panose="02070309020205020404" pitchFamily="49" charset="0"/>
+                <a:cs typeface="Courier New" panose="02070309020205020404" pitchFamily="49" charset="0"/>
+              </a:rPr>
+              <a:t>sitespeed_log.disk</a:t>
+            </a:r>
+            <a:r>
+              <a:rPr lang="en-US" sz="1400" spc="-60" dirty="0">
+                <a:solidFill>
+                  <a:srgbClr val="383838"/>
+                </a:solidFill>
+                <a:latin typeface="Courier New" panose="02070309020205020404" pitchFamily="49" charset="0"/>
+                <a:cs typeface="Courier New" panose="02070309020205020404" pitchFamily="49" charset="0"/>
+              </a:rPr>
+              <a:t> `</a:t>
+            </a:r>
+            <a:r>
+              <a:rPr lang="en-US" sz="1400" spc="-60" dirty="0" err="1">
+                <a:solidFill>
+                  <a:srgbClr val="383838"/>
+                </a:solidFill>
+                <a:latin typeface="Courier New" panose="02070309020205020404" pitchFamily="49" charset="0"/>
+                <a:cs typeface="Courier New" panose="02070309020205020404" pitchFamily="49" charset="0"/>
+              </a:rPr>
+              <a:t>ssh</a:t>
+            </a:r>
+            <a:r>
+              <a:rPr lang="en-US" sz="1400" spc="-60" dirty="0">
+                <a:solidFill>
+                  <a:srgbClr val="383838"/>
+                </a:solidFill>
+                <a:latin typeface="Courier New" panose="02070309020205020404" pitchFamily="49" charset="0"/>
+                <a:cs typeface="Courier New" panose="02070309020205020404" pitchFamily="49" charset="0"/>
+              </a:rPr>
+              <a:t> -</a:t>
+            </a:r>
+            <a:r>
+              <a:rPr lang="en-US" sz="1400" spc="-60" dirty="0" err="1">
+                <a:solidFill>
+                  <a:srgbClr val="383838"/>
+                </a:solidFill>
+                <a:latin typeface="Courier New" panose="02070309020205020404" pitchFamily="49" charset="0"/>
+                <a:cs typeface="Courier New" panose="02070309020205020404" pitchFamily="49" charset="0"/>
+              </a:rPr>
+              <a:t>i</a:t>
+            </a:r>
+            <a:r>
+              <a:rPr lang="en-US" sz="1400" spc="-60" dirty="0">
+                <a:solidFill>
+                  <a:srgbClr val="383838"/>
+                </a:solidFill>
+                <a:latin typeface="Courier New" panose="02070309020205020404" pitchFamily="49" charset="0"/>
+                <a:cs typeface="Courier New" panose="02070309020205020404" pitchFamily="49" charset="0"/>
+              </a:rPr>
+              <a:t> $Key $(</a:t>
+            </a:r>
+            <a:r>
+              <a:rPr lang="en-US" sz="1400" spc="-60" dirty="0" err="1">
+                <a:solidFill>
+                  <a:srgbClr val="383838"/>
+                </a:solidFill>
+                <a:latin typeface="Courier New" panose="02070309020205020404" pitchFamily="49" charset="0"/>
+                <a:cs typeface="Courier New" panose="02070309020205020404" pitchFamily="49" charset="0"/>
+              </a:rPr>
+              <a:t>whoami</a:t>
+            </a:r>
+            <a:r>
+              <a:rPr lang="en-US" sz="1400" spc="-60" dirty="0">
+                <a:solidFill>
+                  <a:srgbClr val="383838"/>
+                </a:solidFill>
+                <a:latin typeface="Courier New" panose="02070309020205020404" pitchFamily="49" charset="0"/>
+                <a:cs typeface="Courier New" panose="02070309020205020404" pitchFamily="49" charset="0"/>
+              </a:rPr>
+              <a:t>)@</a:t>
+            </a:r>
+            <a:r>
+              <a:rPr lang="en-US" sz="1400" spc="-60" dirty="0" err="1">
+                <a:solidFill>
+                  <a:srgbClr val="383838"/>
+                </a:solidFill>
+                <a:latin typeface="Courier New" panose="02070309020205020404" pitchFamily="49" charset="0"/>
+                <a:cs typeface="Courier New" panose="02070309020205020404" pitchFamily="49" charset="0"/>
+              </a:rPr>
+              <a:t>graphite.$Domain</a:t>
+            </a:r>
+            <a:r>
+              <a:rPr lang="en-US" sz="1400" spc="-60" dirty="0">
+                <a:solidFill>
+                  <a:srgbClr val="383838"/>
+                </a:solidFill>
+                <a:latin typeface="Courier New" panose="02070309020205020404" pitchFamily="49" charset="0"/>
+                <a:cs typeface="Courier New" panose="02070309020205020404" pitchFamily="49" charset="0"/>
+              </a:rPr>
+              <a:t> du -s </a:t>
+            </a:r>
+            <a:r>
+              <a:rPr lang="en-US" sz="1400" spc="-60" dirty="0">
+                <a:solidFill>
+                  <a:srgbClr val="383838"/>
+                </a:solidFill>
+                <a:highlight>
+                  <a:srgbClr val="FFFF00"/>
+                </a:highlight>
+                <a:latin typeface="Courier New" panose="02070309020205020404" pitchFamily="49" charset="0"/>
+                <a:cs typeface="Courier New" panose="02070309020205020404" pitchFamily="49" charset="0"/>
+              </a:rPr>
+              <a:t>/</a:t>
+            </a:r>
+            <a:r>
+              <a:rPr lang="en-US" sz="1400" spc="-60" dirty="0" err="1">
+                <a:solidFill>
+                  <a:srgbClr val="383838"/>
+                </a:solidFill>
+                <a:highlight>
+                  <a:srgbClr val="FFFF00"/>
+                </a:highlight>
+                <a:latin typeface="Courier New" panose="02070309020205020404" pitchFamily="49" charset="0"/>
+                <a:cs typeface="Courier New" panose="02070309020205020404" pitchFamily="49" charset="0"/>
+              </a:rPr>
+              <a:t>usr</a:t>
+            </a:r>
+            <a:r>
+              <a:rPr lang="en-US" sz="1400" spc="-60" dirty="0">
+                <a:solidFill>
+                  <a:srgbClr val="383838"/>
+                </a:solidFill>
+                <a:highlight>
+                  <a:srgbClr val="FFFF00"/>
+                </a:highlight>
+                <a:latin typeface="Courier New" panose="02070309020205020404" pitchFamily="49" charset="0"/>
+                <a:cs typeface="Courier New" panose="02070309020205020404" pitchFamily="49" charset="0"/>
+              </a:rPr>
+              <a:t>/local/graphite</a:t>
+            </a:r>
+            <a:r>
+              <a:rPr lang="en-US" sz="1400" spc="-60" dirty="0">
+                <a:solidFill>
+                  <a:srgbClr val="383838"/>
+                </a:solidFill>
+                <a:latin typeface="Courier New" panose="02070309020205020404" pitchFamily="49" charset="0"/>
+                <a:cs typeface="Courier New" panose="02070309020205020404" pitchFamily="49" charset="0"/>
+              </a:rPr>
+              <a:t>/graphite-storage/whisper/</a:t>
+            </a:r>
+            <a:r>
+              <a:rPr lang="en-US" sz="1400" spc="-60" dirty="0" err="1">
+                <a:solidFill>
+                  <a:srgbClr val="383838"/>
+                </a:solidFill>
+                <a:latin typeface="Courier New" panose="02070309020205020404" pitchFamily="49" charset="0"/>
+                <a:cs typeface="Courier New" panose="02070309020205020404" pitchFamily="49" charset="0"/>
+              </a:rPr>
+              <a:t>sitespeed_io</a:t>
+            </a:r>
+            <a:r>
+              <a:rPr lang="en-US" sz="1400" spc="-60" dirty="0">
+                <a:solidFill>
+                  <a:srgbClr val="383838"/>
+                </a:solidFill>
+                <a:latin typeface="Courier New" panose="02070309020205020404" pitchFamily="49" charset="0"/>
+                <a:cs typeface="Courier New" panose="02070309020205020404" pitchFamily="49" charset="0"/>
+              </a:rPr>
+              <a:t> | awk '{print $1}'` `date +%s`" | </a:t>
+            </a:r>
+            <a:r>
+              <a:rPr lang="en-US" sz="1400" spc="-60" dirty="0" err="1">
+                <a:solidFill>
+                  <a:srgbClr val="383838"/>
+                </a:solidFill>
+                <a:latin typeface="Courier New" panose="02070309020205020404" pitchFamily="49" charset="0"/>
+                <a:cs typeface="Courier New" panose="02070309020205020404" pitchFamily="49" charset="0"/>
+              </a:rPr>
+              <a:t>nc</a:t>
+            </a:r>
+            <a:r>
+              <a:rPr lang="en-US" sz="1400" spc="-60" dirty="0">
+                <a:solidFill>
+                  <a:srgbClr val="383838"/>
+                </a:solidFill>
+                <a:latin typeface="Courier New" panose="02070309020205020404" pitchFamily="49" charset="0"/>
+                <a:cs typeface="Courier New" panose="02070309020205020404" pitchFamily="49" charset="0"/>
+              </a:rPr>
+              <a:t> </a:t>
+            </a:r>
+            <a:r>
+              <a:rPr lang="en-US" sz="1400" spc="-60" dirty="0" err="1">
+                <a:solidFill>
+                  <a:srgbClr val="383838"/>
+                </a:solidFill>
+                <a:latin typeface="Courier New" panose="02070309020205020404" pitchFamily="49" charset="0"/>
+                <a:cs typeface="Courier New" panose="02070309020205020404" pitchFamily="49" charset="0"/>
+              </a:rPr>
+              <a:t>graphite.$Domain</a:t>
+            </a:r>
+            <a:r>
+              <a:rPr lang="en-US" sz="1400" spc="-60" dirty="0">
+                <a:solidFill>
+                  <a:srgbClr val="383838"/>
+                </a:solidFill>
+                <a:latin typeface="Courier New" panose="02070309020205020404" pitchFamily="49" charset="0"/>
+                <a:cs typeface="Courier New" panose="02070309020205020404" pitchFamily="49" charset="0"/>
+              </a:rPr>
+              <a:t> 2003 &amp;&gt; /dev/null</a:t>
+            </a:r>
+          </a:p>
+          <a:p>
+            <a:pPr marL="755649" marR="5079" lvl="1" indent="-285750">
+              <a:lnSpc>
+                <a:spcPct val="100000"/>
+              </a:lnSpc>
+              <a:spcBef>
+                <a:spcPts val="0"/>
+              </a:spcBef>
+              <a:spcAft>
+                <a:spcPts val="1200"/>
+              </a:spcAft>
+              <a:buFont typeface="Arial" panose="020B0604020202020204" pitchFamily="34" charset="0"/>
+              <a:buChar char="•"/>
+            </a:pPr>
+            <a:r>
+              <a:rPr lang="en-US" sz="1400" spc="-60" dirty="0">
+                <a:solidFill>
+                  <a:srgbClr val="383838"/>
+                </a:solidFill>
+                <a:latin typeface="Courier New" panose="02070309020205020404" pitchFamily="49" charset="0"/>
+                <a:cs typeface="Courier New" panose="02070309020205020404" pitchFamily="49" charset="0"/>
+              </a:rPr>
+              <a:t>echo "</a:t>
+            </a:r>
+            <a:r>
+              <a:rPr lang="en-US" sz="1400" spc="-60" dirty="0" err="1">
+                <a:solidFill>
+                  <a:srgbClr val="383838"/>
+                </a:solidFill>
+                <a:latin typeface="Courier New" panose="02070309020205020404" pitchFamily="49" charset="0"/>
+                <a:cs typeface="Courier New" panose="02070309020205020404" pitchFamily="49" charset="0"/>
+              </a:rPr>
+              <a:t>sitespeed_log.TLD.disk</a:t>
+            </a:r>
+            <a:r>
+              <a:rPr lang="en-US" sz="1400" spc="-60" dirty="0">
+                <a:solidFill>
+                  <a:srgbClr val="383838"/>
+                </a:solidFill>
+                <a:latin typeface="Courier New" panose="02070309020205020404" pitchFamily="49" charset="0"/>
+                <a:cs typeface="Courier New" panose="02070309020205020404" pitchFamily="49" charset="0"/>
+              </a:rPr>
+              <a:t> `</a:t>
+            </a:r>
+            <a:r>
+              <a:rPr lang="en-US" sz="1400" spc="-60" dirty="0" err="1">
+                <a:solidFill>
+                  <a:srgbClr val="383838"/>
+                </a:solidFill>
+                <a:latin typeface="Courier New" panose="02070309020205020404" pitchFamily="49" charset="0"/>
+                <a:cs typeface="Courier New" panose="02070309020205020404" pitchFamily="49" charset="0"/>
+              </a:rPr>
+              <a:t>ssh</a:t>
+            </a:r>
+            <a:r>
+              <a:rPr lang="en-US" sz="1400" spc="-60" dirty="0">
+                <a:solidFill>
+                  <a:srgbClr val="383838"/>
+                </a:solidFill>
+                <a:latin typeface="Courier New" panose="02070309020205020404" pitchFamily="49" charset="0"/>
+                <a:cs typeface="Courier New" panose="02070309020205020404" pitchFamily="49" charset="0"/>
+              </a:rPr>
+              <a:t> -</a:t>
+            </a:r>
+            <a:r>
+              <a:rPr lang="en-US" sz="1400" spc="-60" dirty="0" err="1">
+                <a:solidFill>
+                  <a:srgbClr val="383838"/>
+                </a:solidFill>
+                <a:latin typeface="Courier New" panose="02070309020205020404" pitchFamily="49" charset="0"/>
+                <a:cs typeface="Courier New" panose="02070309020205020404" pitchFamily="49" charset="0"/>
+              </a:rPr>
+              <a:t>i</a:t>
+            </a:r>
+            <a:r>
+              <a:rPr lang="en-US" sz="1400" spc="-60" dirty="0">
+                <a:solidFill>
+                  <a:srgbClr val="383838"/>
+                </a:solidFill>
+                <a:latin typeface="Courier New" panose="02070309020205020404" pitchFamily="49" charset="0"/>
+                <a:cs typeface="Courier New" panose="02070309020205020404" pitchFamily="49" charset="0"/>
+              </a:rPr>
+              <a:t> $Key $(</a:t>
+            </a:r>
+            <a:r>
+              <a:rPr lang="en-US" sz="1400" spc="-60" dirty="0" err="1">
+                <a:solidFill>
+                  <a:srgbClr val="383838"/>
+                </a:solidFill>
+                <a:latin typeface="Courier New" panose="02070309020205020404" pitchFamily="49" charset="0"/>
+                <a:cs typeface="Courier New" panose="02070309020205020404" pitchFamily="49" charset="0"/>
+              </a:rPr>
+              <a:t>whoami</a:t>
+            </a:r>
+            <a:r>
+              <a:rPr lang="en-US" sz="1400" spc="-60" dirty="0">
+                <a:solidFill>
+                  <a:srgbClr val="383838"/>
+                </a:solidFill>
+                <a:latin typeface="Courier New" panose="02070309020205020404" pitchFamily="49" charset="0"/>
+                <a:cs typeface="Courier New" panose="02070309020205020404" pitchFamily="49" charset="0"/>
+              </a:rPr>
+              <a:t>)@</a:t>
+            </a:r>
+            <a:r>
+              <a:rPr lang="en-US" sz="1400" spc="-60" dirty="0" err="1">
+                <a:solidFill>
+                  <a:srgbClr val="383838"/>
+                </a:solidFill>
+                <a:latin typeface="Courier New" panose="02070309020205020404" pitchFamily="49" charset="0"/>
+                <a:cs typeface="Courier New" panose="02070309020205020404" pitchFamily="49" charset="0"/>
+              </a:rPr>
+              <a:t>graphite.$Domain</a:t>
+            </a:r>
+            <a:r>
+              <a:rPr lang="en-US" sz="1400" spc="-60" dirty="0">
+                <a:solidFill>
+                  <a:srgbClr val="383838"/>
+                </a:solidFill>
+                <a:latin typeface="Courier New" panose="02070309020205020404" pitchFamily="49" charset="0"/>
+                <a:cs typeface="Courier New" panose="02070309020205020404" pitchFamily="49" charset="0"/>
+              </a:rPr>
+              <a:t> du -s </a:t>
+            </a:r>
+            <a:r>
+              <a:rPr lang="en-US" sz="1400" spc="-60" dirty="0">
+                <a:solidFill>
+                  <a:srgbClr val="383838"/>
+                </a:solidFill>
+                <a:highlight>
+                  <a:srgbClr val="FFFF00"/>
+                </a:highlight>
+                <a:latin typeface="Courier New" panose="02070309020205020404" pitchFamily="49" charset="0"/>
+                <a:cs typeface="Courier New" panose="02070309020205020404" pitchFamily="49" charset="0"/>
+              </a:rPr>
+              <a:t>/</a:t>
+            </a:r>
+            <a:r>
+              <a:rPr lang="en-US" sz="1400" spc="-60" dirty="0" err="1">
+                <a:solidFill>
+                  <a:srgbClr val="383838"/>
+                </a:solidFill>
+                <a:highlight>
+                  <a:srgbClr val="FFFF00"/>
+                </a:highlight>
+                <a:latin typeface="Courier New" panose="02070309020205020404" pitchFamily="49" charset="0"/>
+                <a:cs typeface="Courier New" panose="02070309020205020404" pitchFamily="49" charset="0"/>
+              </a:rPr>
+              <a:t>usr</a:t>
+            </a:r>
+            <a:r>
+              <a:rPr lang="en-US" sz="1400" spc="-60" dirty="0">
+                <a:solidFill>
+                  <a:srgbClr val="383838"/>
+                </a:solidFill>
+                <a:highlight>
+                  <a:srgbClr val="FFFF00"/>
+                </a:highlight>
+                <a:latin typeface="Courier New" panose="02070309020205020404" pitchFamily="49" charset="0"/>
+                <a:cs typeface="Courier New" panose="02070309020205020404" pitchFamily="49" charset="0"/>
+              </a:rPr>
+              <a:t>/local/graphite</a:t>
+            </a:r>
+            <a:r>
+              <a:rPr lang="en-US" sz="1400" spc="-60" dirty="0">
+                <a:solidFill>
+                  <a:srgbClr val="383838"/>
+                </a:solidFill>
+                <a:latin typeface="Courier New" panose="02070309020205020404" pitchFamily="49" charset="0"/>
+                <a:cs typeface="Courier New" panose="02070309020205020404" pitchFamily="49" charset="0"/>
+              </a:rPr>
+              <a:t>/graphite-storage/whisper/</a:t>
+            </a:r>
+            <a:r>
+              <a:rPr lang="en-US" sz="1400" spc="-60" dirty="0" err="1">
+                <a:solidFill>
+                  <a:srgbClr val="383838"/>
+                </a:solidFill>
+                <a:latin typeface="Courier New" panose="02070309020205020404" pitchFamily="49" charset="0"/>
+                <a:cs typeface="Courier New" panose="02070309020205020404" pitchFamily="49" charset="0"/>
+              </a:rPr>
+              <a:t>sitespeed_io</a:t>
+            </a:r>
+            <a:r>
+              <a:rPr lang="en-US" sz="1400" spc="-60" dirty="0">
+                <a:solidFill>
+                  <a:srgbClr val="383838"/>
+                </a:solidFill>
+                <a:latin typeface="Courier New" panose="02070309020205020404" pitchFamily="49" charset="0"/>
+                <a:cs typeface="Courier New" panose="02070309020205020404" pitchFamily="49" charset="0"/>
+              </a:rPr>
+              <a:t>/TLD | awk '{print $1}'` `date +%s`" | </a:t>
+            </a:r>
+            <a:r>
+              <a:rPr lang="en-US" sz="1400" spc="-60" dirty="0" err="1">
+                <a:solidFill>
+                  <a:srgbClr val="383838"/>
+                </a:solidFill>
+                <a:latin typeface="Courier New" panose="02070309020205020404" pitchFamily="49" charset="0"/>
+                <a:cs typeface="Courier New" panose="02070309020205020404" pitchFamily="49" charset="0"/>
+              </a:rPr>
+              <a:t>nc</a:t>
+            </a:r>
+            <a:r>
+              <a:rPr lang="en-US" sz="1400" spc="-60" dirty="0">
+                <a:solidFill>
+                  <a:srgbClr val="383838"/>
+                </a:solidFill>
+                <a:latin typeface="Courier New" panose="02070309020205020404" pitchFamily="49" charset="0"/>
+                <a:cs typeface="Courier New" panose="02070309020205020404" pitchFamily="49" charset="0"/>
+              </a:rPr>
+              <a:t> </a:t>
+            </a:r>
+            <a:r>
+              <a:rPr lang="en-US" sz="1400" spc="-60" dirty="0" err="1">
+                <a:solidFill>
+                  <a:srgbClr val="383838"/>
+                </a:solidFill>
+                <a:latin typeface="Courier New" panose="02070309020205020404" pitchFamily="49" charset="0"/>
+                <a:cs typeface="Courier New" panose="02070309020205020404" pitchFamily="49" charset="0"/>
+              </a:rPr>
+              <a:t>graphite.$Domain</a:t>
+            </a:r>
+            <a:r>
+              <a:rPr lang="en-US" sz="1400" spc="-60" dirty="0">
+                <a:solidFill>
+                  <a:srgbClr val="383838"/>
+                </a:solidFill>
+                <a:latin typeface="Courier New" panose="02070309020205020404" pitchFamily="49" charset="0"/>
+                <a:cs typeface="Courier New" panose="02070309020205020404" pitchFamily="49" charset="0"/>
+              </a:rPr>
+              <a:t> 2003 &amp;&gt; /dev/null</a:t>
+            </a:r>
+          </a:p>
+          <a:p>
+            <a:pPr marL="755649" marR="5079" lvl="1" indent="-285750">
+              <a:lnSpc>
+                <a:spcPct val="100000"/>
+              </a:lnSpc>
+              <a:spcBef>
+                <a:spcPts val="0"/>
+              </a:spcBef>
+              <a:spcAft>
+                <a:spcPts val="1200"/>
+              </a:spcAft>
+              <a:buFont typeface="Arial" panose="020B0604020202020204" pitchFamily="34" charset="0"/>
+              <a:buChar char="•"/>
+            </a:pPr>
+            <a:r>
+              <a:rPr lang="en-US" sz="1400" spc="-60" dirty="0">
+                <a:solidFill>
+                  <a:srgbClr val="383838"/>
+                </a:solidFill>
+                <a:latin typeface="Courier New" panose="02070309020205020404" pitchFamily="49" charset="0"/>
+                <a:cs typeface="Courier New" panose="02070309020205020404" pitchFamily="49" charset="0"/>
+              </a:rPr>
+              <a:t>echo "</a:t>
+            </a:r>
+            <a:r>
+              <a:rPr lang="en-US" sz="1400" spc="-60" dirty="0" err="1">
+                <a:solidFill>
+                  <a:srgbClr val="383838"/>
+                </a:solidFill>
+                <a:latin typeface="Courier New" panose="02070309020205020404" pitchFamily="49" charset="0"/>
+                <a:cs typeface="Courier New" panose="02070309020205020404" pitchFamily="49" charset="0"/>
+              </a:rPr>
+              <a:t>sitespeed_log.Competitors.disk</a:t>
+            </a:r>
+            <a:r>
+              <a:rPr lang="en-US" sz="1400" spc="-60" dirty="0">
+                <a:solidFill>
+                  <a:srgbClr val="383838"/>
+                </a:solidFill>
+                <a:latin typeface="Courier New" panose="02070309020205020404" pitchFamily="49" charset="0"/>
+                <a:cs typeface="Courier New" panose="02070309020205020404" pitchFamily="49" charset="0"/>
+              </a:rPr>
+              <a:t> `</a:t>
+            </a:r>
+            <a:r>
+              <a:rPr lang="en-US" sz="1400" spc="-60" dirty="0" err="1">
+                <a:solidFill>
+                  <a:srgbClr val="383838"/>
+                </a:solidFill>
+                <a:latin typeface="Courier New" panose="02070309020205020404" pitchFamily="49" charset="0"/>
+                <a:cs typeface="Courier New" panose="02070309020205020404" pitchFamily="49" charset="0"/>
+              </a:rPr>
+              <a:t>ssh</a:t>
+            </a:r>
+            <a:r>
+              <a:rPr lang="en-US" sz="1400" spc="-60" dirty="0">
+                <a:solidFill>
+                  <a:srgbClr val="383838"/>
+                </a:solidFill>
+                <a:latin typeface="Courier New" panose="02070309020205020404" pitchFamily="49" charset="0"/>
+                <a:cs typeface="Courier New" panose="02070309020205020404" pitchFamily="49" charset="0"/>
+              </a:rPr>
+              <a:t> -</a:t>
+            </a:r>
+            <a:r>
+              <a:rPr lang="en-US" sz="1400" spc="-60" dirty="0" err="1">
+                <a:solidFill>
+                  <a:srgbClr val="383838"/>
+                </a:solidFill>
+                <a:latin typeface="Courier New" panose="02070309020205020404" pitchFamily="49" charset="0"/>
+                <a:cs typeface="Courier New" panose="02070309020205020404" pitchFamily="49" charset="0"/>
+              </a:rPr>
+              <a:t>i</a:t>
+            </a:r>
+            <a:r>
+              <a:rPr lang="en-US" sz="1400" spc="-60" dirty="0">
+                <a:solidFill>
+                  <a:srgbClr val="383838"/>
+                </a:solidFill>
+                <a:latin typeface="Courier New" panose="02070309020205020404" pitchFamily="49" charset="0"/>
+                <a:cs typeface="Courier New" panose="02070309020205020404" pitchFamily="49" charset="0"/>
+              </a:rPr>
+              <a:t> $Key $(</a:t>
+            </a:r>
+            <a:r>
+              <a:rPr lang="en-US" sz="1400" spc="-60" dirty="0" err="1">
+                <a:solidFill>
+                  <a:srgbClr val="383838"/>
+                </a:solidFill>
+                <a:latin typeface="Courier New" panose="02070309020205020404" pitchFamily="49" charset="0"/>
+                <a:cs typeface="Courier New" panose="02070309020205020404" pitchFamily="49" charset="0"/>
+              </a:rPr>
+              <a:t>whoami</a:t>
+            </a:r>
+            <a:r>
+              <a:rPr lang="en-US" sz="1400" spc="-60" dirty="0">
+                <a:solidFill>
+                  <a:srgbClr val="383838"/>
+                </a:solidFill>
+                <a:latin typeface="Courier New" panose="02070309020205020404" pitchFamily="49" charset="0"/>
+                <a:cs typeface="Courier New" panose="02070309020205020404" pitchFamily="49" charset="0"/>
+              </a:rPr>
+              <a:t>)@</a:t>
+            </a:r>
+            <a:r>
+              <a:rPr lang="en-US" sz="1400" spc="-60" dirty="0" err="1">
+                <a:solidFill>
+                  <a:srgbClr val="383838"/>
+                </a:solidFill>
+                <a:latin typeface="Courier New" panose="02070309020205020404" pitchFamily="49" charset="0"/>
+                <a:cs typeface="Courier New" panose="02070309020205020404" pitchFamily="49" charset="0"/>
+              </a:rPr>
+              <a:t>graphite.$Domain</a:t>
+            </a:r>
+            <a:r>
+              <a:rPr lang="en-US" sz="1400" spc="-60" dirty="0">
+                <a:solidFill>
+                  <a:srgbClr val="383838"/>
+                </a:solidFill>
+                <a:latin typeface="Courier New" panose="02070309020205020404" pitchFamily="49" charset="0"/>
+                <a:cs typeface="Courier New" panose="02070309020205020404" pitchFamily="49" charset="0"/>
+              </a:rPr>
+              <a:t> du -s </a:t>
+            </a:r>
+            <a:r>
+              <a:rPr lang="en-US" sz="1400" spc="-60" dirty="0">
+                <a:solidFill>
+                  <a:srgbClr val="383838"/>
+                </a:solidFill>
+                <a:highlight>
+                  <a:srgbClr val="FFFF00"/>
+                </a:highlight>
+                <a:latin typeface="Courier New" panose="02070309020205020404" pitchFamily="49" charset="0"/>
+                <a:cs typeface="Courier New" panose="02070309020205020404" pitchFamily="49" charset="0"/>
+              </a:rPr>
+              <a:t>/</a:t>
+            </a:r>
+            <a:r>
+              <a:rPr lang="en-US" sz="1400" spc="-60" dirty="0" err="1">
+                <a:solidFill>
+                  <a:srgbClr val="383838"/>
+                </a:solidFill>
+                <a:highlight>
+                  <a:srgbClr val="FFFF00"/>
+                </a:highlight>
+                <a:latin typeface="Courier New" panose="02070309020205020404" pitchFamily="49" charset="0"/>
+                <a:cs typeface="Courier New" panose="02070309020205020404" pitchFamily="49" charset="0"/>
+              </a:rPr>
+              <a:t>usr</a:t>
+            </a:r>
+            <a:r>
+              <a:rPr lang="en-US" sz="1400" spc="-60" dirty="0">
+                <a:solidFill>
+                  <a:srgbClr val="383838"/>
+                </a:solidFill>
+                <a:highlight>
+                  <a:srgbClr val="FFFF00"/>
+                </a:highlight>
+                <a:latin typeface="Courier New" panose="02070309020205020404" pitchFamily="49" charset="0"/>
+                <a:cs typeface="Courier New" panose="02070309020205020404" pitchFamily="49" charset="0"/>
+              </a:rPr>
+              <a:t>/local/graphite</a:t>
+            </a:r>
+            <a:r>
+              <a:rPr lang="en-US" sz="1400" spc="-60" dirty="0">
+                <a:solidFill>
+                  <a:srgbClr val="383838"/>
+                </a:solidFill>
+                <a:latin typeface="Courier New" panose="02070309020205020404" pitchFamily="49" charset="0"/>
+                <a:cs typeface="Courier New" panose="02070309020205020404" pitchFamily="49" charset="0"/>
+              </a:rPr>
+              <a:t>/graphite-storage/whisper/</a:t>
+            </a:r>
+            <a:r>
+              <a:rPr lang="en-US" sz="1400" spc="-60" dirty="0" err="1">
+                <a:solidFill>
+                  <a:srgbClr val="383838"/>
+                </a:solidFill>
+                <a:latin typeface="Courier New" panose="02070309020205020404" pitchFamily="49" charset="0"/>
+                <a:cs typeface="Courier New" panose="02070309020205020404" pitchFamily="49" charset="0"/>
+              </a:rPr>
+              <a:t>sitespeed_io</a:t>
+            </a:r>
+            <a:r>
+              <a:rPr lang="en-US" sz="1400" spc="-60" dirty="0">
+                <a:solidFill>
+                  <a:srgbClr val="383838"/>
+                </a:solidFill>
+                <a:latin typeface="Courier New" panose="02070309020205020404" pitchFamily="49" charset="0"/>
+                <a:cs typeface="Courier New" panose="02070309020205020404" pitchFamily="49" charset="0"/>
+              </a:rPr>
+              <a:t>/Competitors | awk '{print $1}'` `date +%s`" | </a:t>
+            </a:r>
+            <a:r>
+              <a:rPr lang="en-US" sz="1400" spc="-60" dirty="0" err="1">
+                <a:solidFill>
+                  <a:srgbClr val="383838"/>
+                </a:solidFill>
+                <a:latin typeface="Courier New" panose="02070309020205020404" pitchFamily="49" charset="0"/>
+                <a:cs typeface="Courier New" panose="02070309020205020404" pitchFamily="49" charset="0"/>
+              </a:rPr>
+              <a:t>nc</a:t>
+            </a:r>
+            <a:r>
+              <a:rPr lang="en-US" sz="1400" spc="-60" dirty="0">
+                <a:solidFill>
+                  <a:srgbClr val="383838"/>
+                </a:solidFill>
+                <a:latin typeface="Courier New" panose="02070309020205020404" pitchFamily="49" charset="0"/>
+                <a:cs typeface="Courier New" panose="02070309020205020404" pitchFamily="49" charset="0"/>
+              </a:rPr>
+              <a:t> </a:t>
+            </a:r>
+            <a:r>
+              <a:rPr lang="en-US" sz="1400" spc="-60" dirty="0" err="1">
+                <a:solidFill>
+                  <a:srgbClr val="383838"/>
+                </a:solidFill>
+                <a:latin typeface="Courier New" panose="02070309020205020404" pitchFamily="49" charset="0"/>
+                <a:cs typeface="Courier New" panose="02070309020205020404" pitchFamily="49" charset="0"/>
+              </a:rPr>
+              <a:t>graphite.$Domain</a:t>
+            </a:r>
+            <a:r>
+              <a:rPr lang="en-US" sz="1400" spc="-60" dirty="0">
+                <a:solidFill>
+                  <a:srgbClr val="383838"/>
+                </a:solidFill>
+                <a:latin typeface="Courier New" panose="02070309020205020404" pitchFamily="49" charset="0"/>
+                <a:cs typeface="Courier New" panose="02070309020205020404" pitchFamily="49" charset="0"/>
+              </a:rPr>
+              <a:t> 2003 &amp;&gt; /dev/null</a:t>
+            </a:r>
+          </a:p>
+          <a:p>
+            <a:pPr marL="298449" marR="5079" indent="-285750">
+              <a:lnSpc>
+                <a:spcPct val="100000"/>
+              </a:lnSpc>
+              <a:spcBef>
+                <a:spcPts val="0"/>
+              </a:spcBef>
+              <a:spcAft>
+                <a:spcPts val="1200"/>
+              </a:spcAft>
+              <a:buFont typeface="Arial" panose="020B0604020202020204" pitchFamily="34" charset="0"/>
+              <a:buChar char="•"/>
+            </a:pPr>
+            <a:r>
+              <a:rPr lang="en-US" sz="1800" b="1" spc="-60" dirty="0">
+                <a:solidFill>
+                  <a:srgbClr val="383838"/>
+                </a:solidFill>
+                <a:latin typeface="Avenir Book" panose="02000503020000020003" pitchFamily="2" charset="0"/>
+                <a:cs typeface="Courier New" panose="02070309020205020404" pitchFamily="49" charset="0"/>
+              </a:rPr>
+              <a:t>SSH back into the Graphite/Grafana server to restart the Graphite database</a:t>
+            </a:r>
+          </a:p>
+          <a:p>
+            <a:pPr marL="755649" marR="5079" lvl="1" indent="-285750">
+              <a:lnSpc>
+                <a:spcPct val="100000"/>
+              </a:lnSpc>
+              <a:spcBef>
+                <a:spcPts val="0"/>
+              </a:spcBef>
+              <a:spcAft>
+                <a:spcPts val="1200"/>
+              </a:spcAft>
+              <a:buFont typeface="Arial" panose="020B0604020202020204" pitchFamily="34" charset="0"/>
+              <a:buChar char="•"/>
+            </a:pPr>
+            <a:r>
+              <a:rPr lang="en-US" sz="1400" spc="-60" dirty="0" err="1">
+                <a:solidFill>
+                  <a:srgbClr val="383838"/>
+                </a:solidFill>
+                <a:latin typeface="Courier New" panose="02070309020205020404" pitchFamily="49" charset="0"/>
+                <a:cs typeface="Courier New" panose="02070309020205020404" pitchFamily="49" charset="0"/>
+              </a:rPr>
+              <a:t>sudo</a:t>
+            </a:r>
+            <a:r>
+              <a:rPr lang="en-US" sz="1400" spc="-60" dirty="0">
+                <a:solidFill>
+                  <a:srgbClr val="383838"/>
+                </a:solidFill>
+                <a:latin typeface="Courier New" panose="02070309020205020404" pitchFamily="49" charset="0"/>
+                <a:cs typeface="Courier New" panose="02070309020205020404" pitchFamily="49" charset="0"/>
+              </a:rPr>
+              <a:t> /</a:t>
+            </a:r>
+            <a:r>
+              <a:rPr lang="en-US" sz="1400" spc="-60" dirty="0" err="1">
+                <a:solidFill>
+                  <a:srgbClr val="383838"/>
+                </a:solidFill>
+                <a:latin typeface="Courier New" panose="02070309020205020404" pitchFamily="49" charset="0"/>
+                <a:cs typeface="Courier New" panose="02070309020205020404" pitchFamily="49" charset="0"/>
+              </a:rPr>
+              <a:t>usr</a:t>
+            </a:r>
+            <a:r>
+              <a:rPr lang="en-US" sz="1400" spc="-60" dirty="0">
+                <a:solidFill>
+                  <a:srgbClr val="383838"/>
+                </a:solidFill>
+                <a:latin typeface="Courier New" panose="02070309020205020404" pitchFamily="49" charset="0"/>
+                <a:cs typeface="Courier New" panose="02070309020205020404" pitchFamily="49" charset="0"/>
+              </a:rPr>
+              <a:t>/local/graphite/</a:t>
+            </a:r>
+            <a:r>
+              <a:rPr lang="en-US" sz="1400" spc="-60" dirty="0" err="1">
+                <a:solidFill>
+                  <a:srgbClr val="383838"/>
+                </a:solidFill>
+                <a:latin typeface="Courier New" panose="02070309020205020404" pitchFamily="49" charset="0"/>
+                <a:cs typeface="Courier New" panose="02070309020205020404" pitchFamily="49" charset="0"/>
+              </a:rPr>
+              <a:t>graphite.sh</a:t>
+            </a:r>
+            <a:r>
+              <a:rPr lang="en-US" sz="1400" spc="-60" dirty="0">
+                <a:solidFill>
+                  <a:srgbClr val="383838"/>
+                </a:solidFill>
+                <a:latin typeface="Courier New" panose="02070309020205020404" pitchFamily="49" charset="0"/>
+                <a:cs typeface="Courier New" panose="02070309020205020404" pitchFamily="49" charset="0"/>
+              </a:rPr>
+              <a:t> start</a:t>
+            </a:r>
+          </a:p>
+          <a:p>
+            <a:pPr marL="755649" marR="5079" lvl="1" indent="-285750">
+              <a:lnSpc>
+                <a:spcPct val="100000"/>
+              </a:lnSpc>
+              <a:spcBef>
+                <a:spcPts val="0"/>
+              </a:spcBef>
+              <a:spcAft>
+                <a:spcPts val="1200"/>
+              </a:spcAft>
+              <a:buFont typeface="Arial" panose="020B0604020202020204" pitchFamily="34" charset="0"/>
+              <a:buChar char="•"/>
+            </a:pPr>
+            <a:endParaRPr lang="en-US" sz="1400" b="1" spc="-60" dirty="0">
+              <a:solidFill>
+                <a:srgbClr val="383838"/>
+              </a:solidFill>
+              <a:latin typeface="Avenir Book" panose="02000503020000020003" pitchFamily="2" charset="0"/>
+              <a:cs typeface="Courier New" panose="02070309020205020404" pitchFamily="49" charset="0"/>
+            </a:endParaRPr>
+          </a:p>
+          <a:p>
+            <a:pPr marL="298449" marR="5079" indent="-285750">
+              <a:lnSpc>
+                <a:spcPct val="100000"/>
+              </a:lnSpc>
+              <a:spcBef>
+                <a:spcPts val="0"/>
+              </a:spcBef>
+              <a:spcAft>
+                <a:spcPts val="1200"/>
+              </a:spcAft>
+              <a:buFont typeface="Arial" panose="020B0604020202020204" pitchFamily="34" charset="0"/>
+              <a:buChar char="•"/>
+            </a:pPr>
+            <a:endParaRPr lang="en-US" sz="1800" spc="-60" dirty="0">
+              <a:solidFill>
+                <a:srgbClr val="383838"/>
+              </a:solidFill>
+              <a:latin typeface="Courier New" panose="02070309020205020404" pitchFamily="49" charset="0"/>
+              <a:cs typeface="Courier New" panose="02070309020205020404" pitchFamily="49" charset="0"/>
+            </a:endParaRPr>
+          </a:p>
+        </p:txBody>
+      </p:sp>
+    </p:spTree>
+    <p:extLst>
+      <p:ext uri="{BB962C8B-B14F-4D97-AF65-F5344CB8AC3E}">
+        <p14:creationId xmlns:p14="http://schemas.microsoft.com/office/powerpoint/2010/main" val="1661568426"/>
       </p:ext>
     </p:extLst>
   </p:cSld>

</xml_diff>